<commit_message>
Added CJM-Mall-Example to Presentation
</commit_message>
<xml_diff>
--- a/Praesentation/Präsentation_Tim.pptx
+++ b/Praesentation/Präsentation_Tim.pptx
@@ -5,20 +5,25 @@
     <p:sldMasterId id="2147483648" r:id="rId1"/>
   </p:sldMasterIdLst>
   <p:notesMasterIdLst>
-    <p:notesMasterId r:id="rId13"/>
+    <p:notesMasterId r:id="rId18"/>
   </p:notesMasterIdLst>
   <p:sldIdLst>
     <p:sldId id="256" r:id="rId2"/>
     <p:sldId id="267" r:id="rId3"/>
     <p:sldId id="262" r:id="rId4"/>
     <p:sldId id="261" r:id="rId5"/>
-    <p:sldId id="260" r:id="rId6"/>
-    <p:sldId id="264" r:id="rId7"/>
-    <p:sldId id="265" r:id="rId8"/>
-    <p:sldId id="258" r:id="rId9"/>
-    <p:sldId id="266" r:id="rId10"/>
-    <p:sldId id="259" r:id="rId11"/>
-    <p:sldId id="263" r:id="rId12"/>
+    <p:sldId id="264" r:id="rId6"/>
+    <p:sldId id="265" r:id="rId7"/>
+    <p:sldId id="258" r:id="rId8"/>
+    <p:sldId id="266" r:id="rId9"/>
+    <p:sldId id="268" r:id="rId10"/>
+    <p:sldId id="269" r:id="rId11"/>
+    <p:sldId id="270" r:id="rId12"/>
+    <p:sldId id="271" r:id="rId13"/>
+    <p:sldId id="259" r:id="rId14"/>
+    <p:sldId id="263" r:id="rId15"/>
+    <p:sldId id="272" r:id="rId16"/>
+    <p:sldId id="273" r:id="rId17"/>
   </p:sldIdLst>
   <p:sldSz cx="12192000" cy="6858000"/>
   <p:notesSz cx="6858000" cy="9144000"/>
@@ -127,7 +132,7 @@
 
 <file path=ppt/commentAuthors.xml><?xml version="1.0" encoding="utf-8"?>
 <p:cmAuthorLst xmlns:a="http://schemas.openxmlformats.org/drawingml/2006/main" xmlns:r="http://schemas.openxmlformats.org/officeDocument/2006/relationships" xmlns:p="http://schemas.openxmlformats.org/presentationml/2006/main">
-  <p:cmAuthor id="1" name="Tim Böckel" initials="TB" lastIdx="7" clrIdx="0">
+  <p:cmAuthor id="1" name="Tim Böckel" initials="TB" lastIdx="8" clrIdx="0">
     <p:extLst>
       <p:ext uri="{19B8F6BF-5375-455C-9EA6-DF929625EA0E}">
         <p15:presenceInfo xmlns:p15="http://schemas.microsoft.com/office/powerpoint/2012/main" userId="139bf3991ca47324" providerId="Windows Live"/>
@@ -140,7 +145,7 @@
 <file path=ppt/revisionInfo.xml><?xml version="1.0" encoding="utf-8"?>
 <p1510:revInfo xmlns:a="http://schemas.openxmlformats.org/drawingml/2006/main" xmlns:r="http://schemas.openxmlformats.org/officeDocument/2006/relationships" xmlns:p1510="http://schemas.microsoft.com/office/powerpoint/2015/10/main">
   <p1510:revLst>
-    <p1510:client id="{ABE0A911-5BA5-4D41-B116-458700B76195}" v="26" dt="2021-06-05T08:58:45.678"/>
+    <p1510:client id="{F23E6AC7-6F80-426C-8EA5-4E59630F2B8F}" v="23" dt="2021-06-06T15:00:43.025"/>
   </p1510:revLst>
 </p1510:revInfo>
 </file>
@@ -924,6 +929,550 @@
             <ac:picMk id="8" creationId="{71345C35-956C-44B6-93CE-A7F14FA6BDB7}"/>
           </ac:picMkLst>
         </pc:picChg>
+      </pc:sldChg>
+    </pc:docChg>
+  </pc:docChgLst>
+  <pc:docChgLst>
+    <pc:chgData name="Tim Böckel" userId="139bf3991ca47324" providerId="LiveId" clId="{F23E6AC7-6F80-426C-8EA5-4E59630F2B8F}"/>
+    <pc:docChg chg="undo custSel addSld delSld modSld">
+      <pc:chgData name="Tim Böckel" userId="139bf3991ca47324" providerId="LiveId" clId="{F23E6AC7-6F80-426C-8EA5-4E59630F2B8F}" dt="2021-06-06T15:00:33.333" v="671"/>
+      <pc:docMkLst>
+        <pc:docMk/>
+      </pc:docMkLst>
+      <pc:sldChg chg="delSp mod">
+        <pc:chgData name="Tim Böckel" userId="139bf3991ca47324" providerId="LiveId" clId="{F23E6AC7-6F80-426C-8EA5-4E59630F2B8F}" dt="2021-06-06T14:18:19.961" v="511" actId="478"/>
+        <pc:sldMkLst>
+          <pc:docMk/>
+          <pc:sldMk cId="180445862" sldId="256"/>
+        </pc:sldMkLst>
+        <pc:spChg chg="del">
+          <ac:chgData name="Tim Böckel" userId="139bf3991ca47324" providerId="LiveId" clId="{F23E6AC7-6F80-426C-8EA5-4E59630F2B8F}" dt="2021-06-06T14:18:19.961" v="511" actId="478"/>
+          <ac:spMkLst>
+            <pc:docMk/>
+            <pc:sldMk cId="180445862" sldId="256"/>
+            <ac:spMk id="6" creationId="{6EF0713A-87F1-4C81-8331-DD272A13DC97}"/>
+          </ac:spMkLst>
+        </pc:spChg>
+      </pc:sldChg>
+      <pc:sldChg chg="addSp delSp modSp mod setBg">
+        <pc:chgData name="Tim Böckel" userId="139bf3991ca47324" providerId="LiveId" clId="{F23E6AC7-6F80-426C-8EA5-4E59630F2B8F}" dt="2021-06-06T14:40:36.767" v="636" actId="404"/>
+        <pc:sldMkLst>
+          <pc:docMk/>
+          <pc:sldMk cId="989028442" sldId="259"/>
+        </pc:sldMkLst>
+        <pc:spChg chg="mod">
+          <ac:chgData name="Tim Böckel" userId="139bf3991ca47324" providerId="LiveId" clId="{F23E6AC7-6F80-426C-8EA5-4E59630F2B8F}" dt="2021-06-06T14:33:39.130" v="580" actId="26606"/>
+          <ac:spMkLst>
+            <pc:docMk/>
+            <pc:sldMk cId="989028442" sldId="259"/>
+            <ac:spMk id="2" creationId="{7A192B9F-EBFA-4972-A930-6BB6E58FFF3D}"/>
+          </ac:spMkLst>
+        </pc:spChg>
+        <pc:spChg chg="mod">
+          <ac:chgData name="Tim Böckel" userId="139bf3991ca47324" providerId="LiveId" clId="{F23E6AC7-6F80-426C-8EA5-4E59630F2B8F}" dt="2021-06-06T14:39:07.177" v="625" actId="1076"/>
+          <ac:spMkLst>
+            <pc:docMk/>
+            <pc:sldMk cId="989028442" sldId="259"/>
+            <ac:spMk id="3" creationId="{68AF4279-EE49-4CBE-A19A-AA481D02B38D}"/>
+          </ac:spMkLst>
+        </pc:spChg>
+        <pc:spChg chg="del mod ord">
+          <ac:chgData name="Tim Böckel" userId="139bf3991ca47324" providerId="LiveId" clId="{F23E6AC7-6F80-426C-8EA5-4E59630F2B8F}" dt="2021-06-06T14:39:54.752" v="629"/>
+          <ac:spMkLst>
+            <pc:docMk/>
+            <pc:sldMk cId="989028442" sldId="259"/>
+            <ac:spMk id="4" creationId="{EAF14A32-A629-45EB-9B55-508FBB5D14D7}"/>
+          </ac:spMkLst>
+        </pc:spChg>
+        <pc:spChg chg="add del mod">
+          <ac:chgData name="Tim Böckel" userId="139bf3991ca47324" providerId="LiveId" clId="{F23E6AC7-6F80-426C-8EA5-4E59630F2B8F}" dt="2021-06-06T14:40:36.767" v="636" actId="404"/>
+          <ac:spMkLst>
+            <pc:docMk/>
+            <pc:sldMk cId="989028442" sldId="259"/>
+            <ac:spMk id="7" creationId="{8D54A260-4F1D-4FC7-99B9-6710A955ADAB}"/>
+          </ac:spMkLst>
+        </pc:spChg>
+        <pc:spChg chg="add">
+          <ac:chgData name="Tim Böckel" userId="139bf3991ca47324" providerId="LiveId" clId="{F23E6AC7-6F80-426C-8EA5-4E59630F2B8F}" dt="2021-06-06T14:33:39.130" v="580" actId="26606"/>
+          <ac:spMkLst>
+            <pc:docMk/>
+            <pc:sldMk cId="989028442" sldId="259"/>
+            <ac:spMk id="11" creationId="{22587ECF-85E9-4393-9D87-8EB6F3F6C208}"/>
+          </ac:spMkLst>
+        </pc:spChg>
+        <pc:picChg chg="add mod">
+          <ac:chgData name="Tim Böckel" userId="139bf3991ca47324" providerId="LiveId" clId="{F23E6AC7-6F80-426C-8EA5-4E59630F2B8F}" dt="2021-06-06T14:33:39.130" v="580" actId="26606"/>
+          <ac:picMkLst>
+            <pc:docMk/>
+            <pc:sldMk cId="989028442" sldId="259"/>
+            <ac:picMk id="6" creationId="{B5E463BB-6709-4502-9835-95D112427E9A}"/>
+          </ac:picMkLst>
+        </pc:picChg>
+      </pc:sldChg>
+      <pc:sldChg chg="del">
+        <pc:chgData name="Tim Böckel" userId="139bf3991ca47324" providerId="LiveId" clId="{F23E6AC7-6F80-426C-8EA5-4E59630F2B8F}" dt="2021-06-06T14:20:16.347" v="549" actId="2696"/>
+        <pc:sldMkLst>
+          <pc:docMk/>
+          <pc:sldMk cId="1568136836" sldId="260"/>
+        </pc:sldMkLst>
+      </pc:sldChg>
+      <pc:sldChg chg="delSp modSp mod">
+        <pc:chgData name="Tim Böckel" userId="139bf3991ca47324" providerId="LiveId" clId="{F23E6AC7-6F80-426C-8EA5-4E59630F2B8F}" dt="2021-06-06T14:53:32.601" v="653"/>
+        <pc:sldMkLst>
+          <pc:docMk/>
+          <pc:sldMk cId="1665137363" sldId="261"/>
+        </pc:sldMkLst>
+        <pc:spChg chg="del mod">
+          <ac:chgData name="Tim Böckel" userId="139bf3991ca47324" providerId="LiveId" clId="{F23E6AC7-6F80-426C-8EA5-4E59630F2B8F}" dt="2021-06-06T14:53:32.601" v="653"/>
+          <ac:spMkLst>
+            <pc:docMk/>
+            <pc:sldMk cId="1665137363" sldId="261"/>
+            <ac:spMk id="6" creationId="{10997452-4696-4E3D-B00A-8488F51132DE}"/>
+          </ac:spMkLst>
+        </pc:spChg>
+      </pc:sldChg>
+      <pc:sldChg chg="delSp mod">
+        <pc:chgData name="Tim Böckel" userId="139bf3991ca47324" providerId="LiveId" clId="{F23E6AC7-6F80-426C-8EA5-4E59630F2B8F}" dt="2021-06-06T14:18:22.569" v="512" actId="478"/>
+        <pc:sldMkLst>
+          <pc:docMk/>
+          <pc:sldMk cId="3884062741" sldId="262"/>
+        </pc:sldMkLst>
+        <pc:spChg chg="del">
+          <ac:chgData name="Tim Böckel" userId="139bf3991ca47324" providerId="LiveId" clId="{F23E6AC7-6F80-426C-8EA5-4E59630F2B8F}" dt="2021-06-06T14:18:22.569" v="512" actId="478"/>
+          <ac:spMkLst>
+            <pc:docMk/>
+            <pc:sldMk cId="3884062741" sldId="262"/>
+            <ac:spMk id="6" creationId="{60506E7C-0D8A-4387-88CB-5F161EBC6FAF}"/>
+          </ac:spMkLst>
+        </pc:spChg>
+      </pc:sldChg>
+      <pc:sldChg chg="addSp modSp mod setBg">
+        <pc:chgData name="Tim Böckel" userId="139bf3991ca47324" providerId="LiveId" clId="{F23E6AC7-6F80-426C-8EA5-4E59630F2B8F}" dt="2021-06-06T14:33:30.480" v="577" actId="26606"/>
+        <pc:sldMkLst>
+          <pc:docMk/>
+          <pc:sldMk cId="3297084981" sldId="263"/>
+        </pc:sldMkLst>
+        <pc:spChg chg="mod">
+          <ac:chgData name="Tim Böckel" userId="139bf3991ca47324" providerId="LiveId" clId="{F23E6AC7-6F80-426C-8EA5-4E59630F2B8F}" dt="2021-06-06T14:33:30.480" v="577" actId="26606"/>
+          <ac:spMkLst>
+            <pc:docMk/>
+            <pc:sldMk cId="3297084981" sldId="263"/>
+            <ac:spMk id="2" creationId="{7604E352-3A07-4751-A9BF-C6AD3376B599}"/>
+          </ac:spMkLst>
+        </pc:spChg>
+        <pc:spChg chg="mod">
+          <ac:chgData name="Tim Böckel" userId="139bf3991ca47324" providerId="LiveId" clId="{F23E6AC7-6F80-426C-8EA5-4E59630F2B8F}" dt="2021-06-06T14:33:30.480" v="577" actId="26606"/>
+          <ac:spMkLst>
+            <pc:docMk/>
+            <pc:sldMk cId="3297084981" sldId="263"/>
+            <ac:spMk id="3" creationId="{002C0816-74F8-4874-87EE-C808D5CB40D1}"/>
+          </ac:spMkLst>
+        </pc:spChg>
+        <pc:spChg chg="add">
+          <ac:chgData name="Tim Böckel" userId="139bf3991ca47324" providerId="LiveId" clId="{F23E6AC7-6F80-426C-8EA5-4E59630F2B8F}" dt="2021-06-06T14:33:30.480" v="577" actId="26606"/>
+          <ac:spMkLst>
+            <pc:docMk/>
+            <pc:sldMk cId="3297084981" sldId="263"/>
+            <ac:spMk id="10" creationId="{22587ECF-85E9-4393-9D87-8EB6F3F6C208}"/>
+          </ac:spMkLst>
+        </pc:spChg>
+        <pc:picChg chg="add mod">
+          <ac:chgData name="Tim Böckel" userId="139bf3991ca47324" providerId="LiveId" clId="{F23E6AC7-6F80-426C-8EA5-4E59630F2B8F}" dt="2021-06-06T14:33:30.480" v="577" actId="26606"/>
+          <ac:picMkLst>
+            <pc:docMk/>
+            <pc:sldMk cId="3297084981" sldId="263"/>
+            <ac:picMk id="5" creationId="{B9B2E737-63B1-4ED5-8090-48708429B4B6}"/>
+          </ac:picMkLst>
+        </pc:picChg>
+      </pc:sldChg>
+      <pc:sldChg chg="modSp mod">
+        <pc:chgData name="Tim Böckel" userId="139bf3991ca47324" providerId="LiveId" clId="{F23E6AC7-6F80-426C-8EA5-4E59630F2B8F}" dt="2021-06-06T14:52:56.908" v="646" actId="255"/>
+        <pc:sldMkLst>
+          <pc:docMk/>
+          <pc:sldMk cId="1054796877" sldId="264"/>
+        </pc:sldMkLst>
+        <pc:spChg chg="mod">
+          <ac:chgData name="Tim Böckel" userId="139bf3991ca47324" providerId="LiveId" clId="{F23E6AC7-6F80-426C-8EA5-4E59630F2B8F}" dt="2021-06-06T14:52:56.908" v="646" actId="255"/>
+          <ac:spMkLst>
+            <pc:docMk/>
+            <pc:sldMk cId="1054796877" sldId="264"/>
+            <ac:spMk id="4" creationId="{F2778520-16A5-442E-8B6F-13AB50F62432}"/>
+          </ac:spMkLst>
+        </pc:spChg>
+      </pc:sldChg>
+      <pc:sldChg chg="addSp delSp modSp mod">
+        <pc:chgData name="Tim Böckel" userId="139bf3991ca47324" providerId="LiveId" clId="{F23E6AC7-6F80-426C-8EA5-4E59630F2B8F}" dt="2021-06-06T14:53:04.827" v="650"/>
+        <pc:sldMkLst>
+          <pc:docMk/>
+          <pc:sldMk cId="979458214" sldId="265"/>
+        </pc:sldMkLst>
+        <pc:spChg chg="del mod">
+          <ac:chgData name="Tim Böckel" userId="139bf3991ca47324" providerId="LiveId" clId="{F23E6AC7-6F80-426C-8EA5-4E59630F2B8F}" dt="2021-06-06T14:53:04.530" v="649" actId="478"/>
+          <ac:spMkLst>
+            <pc:docMk/>
+            <pc:sldMk cId="979458214" sldId="265"/>
+            <ac:spMk id="4" creationId="{F20ECE82-4680-45C4-8768-DFC0CDF03884}"/>
+          </ac:spMkLst>
+        </pc:spChg>
+        <pc:spChg chg="add del mod">
+          <ac:chgData name="Tim Böckel" userId="139bf3991ca47324" providerId="LiveId" clId="{F23E6AC7-6F80-426C-8EA5-4E59630F2B8F}" dt="2021-06-06T14:53:03.358" v="648"/>
+          <ac:spMkLst>
+            <pc:docMk/>
+            <pc:sldMk cId="979458214" sldId="265"/>
+            <ac:spMk id="6" creationId="{5C96750D-D30A-43DE-955D-5A5F80CB27C8}"/>
+          </ac:spMkLst>
+        </pc:spChg>
+        <pc:spChg chg="add mod">
+          <ac:chgData name="Tim Böckel" userId="139bf3991ca47324" providerId="LiveId" clId="{F23E6AC7-6F80-426C-8EA5-4E59630F2B8F}" dt="2021-06-06T14:53:04.827" v="650"/>
+          <ac:spMkLst>
+            <pc:docMk/>
+            <pc:sldMk cId="979458214" sldId="265"/>
+            <ac:spMk id="7" creationId="{163356FB-8450-43EE-B42D-F347717A41C6}"/>
+          </ac:spMkLst>
+        </pc:spChg>
+      </pc:sldChg>
+      <pc:sldChg chg="delSp modSp mod">
+        <pc:chgData name="Tim Böckel" userId="139bf3991ca47324" providerId="LiveId" clId="{F23E6AC7-6F80-426C-8EA5-4E59630F2B8F}" dt="2021-06-06T14:54:22.144" v="660"/>
+        <pc:sldMkLst>
+          <pc:docMk/>
+          <pc:sldMk cId="4153221817" sldId="267"/>
+        </pc:sldMkLst>
+        <pc:spChg chg="del">
+          <ac:chgData name="Tim Böckel" userId="139bf3991ca47324" providerId="LiveId" clId="{F23E6AC7-6F80-426C-8EA5-4E59630F2B8F}" dt="2021-06-06T14:53:47.148" v="654" actId="478"/>
+          <ac:spMkLst>
+            <pc:docMk/>
+            <pc:sldMk cId="4153221817" sldId="267"/>
+            <ac:spMk id="3" creationId="{B32C0530-AE47-4AEB-9E30-CB903D28A7BB}"/>
+          </ac:spMkLst>
+        </pc:spChg>
+        <pc:spChg chg="mod">
+          <ac:chgData name="Tim Böckel" userId="139bf3991ca47324" providerId="LiveId" clId="{F23E6AC7-6F80-426C-8EA5-4E59630F2B8F}" dt="2021-06-06T14:54:22.144" v="660"/>
+          <ac:spMkLst>
+            <pc:docMk/>
+            <pc:sldMk cId="4153221817" sldId="267"/>
+            <ac:spMk id="9" creationId="{245E1114-0D50-4F21-9E82-2A8FEE02D909}"/>
+          </ac:spMkLst>
+        </pc:spChg>
+      </pc:sldChg>
+      <pc:sldChg chg="addSp delSp modSp new mod setBg addCm">
+        <pc:chgData name="Tim Böckel" userId="139bf3991ca47324" providerId="LiveId" clId="{F23E6AC7-6F80-426C-8EA5-4E59630F2B8F}" dt="2021-06-06T14:07:43.949" v="141" actId="790"/>
+        <pc:sldMkLst>
+          <pc:docMk/>
+          <pc:sldMk cId="1622403623" sldId="268"/>
+        </pc:sldMkLst>
+        <pc:spChg chg="mod">
+          <ac:chgData name="Tim Böckel" userId="139bf3991ca47324" providerId="LiveId" clId="{F23E6AC7-6F80-426C-8EA5-4E59630F2B8F}" dt="2021-06-06T14:07:43.949" v="141" actId="790"/>
+          <ac:spMkLst>
+            <pc:docMk/>
+            <pc:sldMk cId="1622403623" sldId="268"/>
+            <ac:spMk id="2" creationId="{FF597BAC-6CF9-4073-A515-BB628891AE92}"/>
+          </ac:spMkLst>
+        </pc:spChg>
+        <pc:spChg chg="del">
+          <ac:chgData name="Tim Böckel" userId="139bf3991ca47324" providerId="LiveId" clId="{F23E6AC7-6F80-426C-8EA5-4E59630F2B8F}" dt="2021-06-06T13:59:09.342" v="14" actId="478"/>
+          <ac:spMkLst>
+            <pc:docMk/>
+            <pc:sldMk cId="1622403623" sldId="268"/>
+            <ac:spMk id="3" creationId="{A450F9FD-4E56-4213-A4F5-A1041D0EE1F0}"/>
+          </ac:spMkLst>
+        </pc:spChg>
+        <pc:spChg chg="add mod">
+          <ac:chgData name="Tim Böckel" userId="139bf3991ca47324" providerId="LiveId" clId="{F23E6AC7-6F80-426C-8EA5-4E59630F2B8F}" dt="2021-06-06T14:07:29.536" v="134" actId="14100"/>
+          <ac:spMkLst>
+            <pc:docMk/>
+            <pc:sldMk cId="1622403623" sldId="268"/>
+            <ac:spMk id="4" creationId="{EE98651D-1846-4664-86CB-10AB701FE291}"/>
+          </ac:spMkLst>
+        </pc:spChg>
+        <pc:spChg chg="add del">
+          <ac:chgData name="Tim Böckel" userId="139bf3991ca47324" providerId="LiveId" clId="{F23E6AC7-6F80-426C-8EA5-4E59630F2B8F}" dt="2021-06-06T14:06:55.079" v="119" actId="26606"/>
+          <ac:spMkLst>
+            <pc:docMk/>
+            <pc:sldMk cId="1622403623" sldId="268"/>
+            <ac:spMk id="11" creationId="{5E39A796-BE83-48B1-B33F-35C4A32AAB57}"/>
+          </ac:spMkLst>
+        </pc:spChg>
+        <pc:spChg chg="add del">
+          <ac:chgData name="Tim Böckel" userId="139bf3991ca47324" providerId="LiveId" clId="{F23E6AC7-6F80-426C-8EA5-4E59630F2B8F}" dt="2021-06-06T14:06:55.079" v="119" actId="26606"/>
+          <ac:spMkLst>
+            <pc:docMk/>
+            <pc:sldMk cId="1622403623" sldId="268"/>
+            <ac:spMk id="13" creationId="{72F84B47-E267-4194-8194-831DB7B5547F}"/>
+          </ac:spMkLst>
+        </pc:spChg>
+        <pc:spChg chg="add del">
+          <ac:chgData name="Tim Böckel" userId="139bf3991ca47324" providerId="LiveId" clId="{F23E6AC7-6F80-426C-8EA5-4E59630F2B8F}" dt="2021-06-06T14:07:04.264" v="122" actId="26606"/>
+          <ac:spMkLst>
+            <pc:docMk/>
+            <pc:sldMk cId="1622403623" sldId="268"/>
+            <ac:spMk id="18" creationId="{22587ECF-85E9-4393-9D87-8EB6F3F6C208}"/>
+          </ac:spMkLst>
+        </pc:spChg>
+        <pc:spChg chg="add">
+          <ac:chgData name="Tim Böckel" userId="139bf3991ca47324" providerId="LiveId" clId="{F23E6AC7-6F80-426C-8EA5-4E59630F2B8F}" dt="2021-06-06T14:07:04.264" v="122" actId="26606"/>
+          <ac:spMkLst>
+            <pc:docMk/>
+            <pc:sldMk cId="1622403623" sldId="268"/>
+            <ac:spMk id="23" creationId="{D19BB8BE-1351-4D9B-B761-F84A0B5B6519}"/>
+          </ac:spMkLst>
+        </pc:spChg>
+        <pc:picChg chg="add mod">
+          <ac:chgData name="Tim Böckel" userId="139bf3991ca47324" providerId="LiveId" clId="{F23E6AC7-6F80-426C-8EA5-4E59630F2B8F}" dt="2021-06-06T14:07:31.099" v="135" actId="1076"/>
+          <ac:picMkLst>
+            <pc:docMk/>
+            <pc:sldMk cId="1622403623" sldId="268"/>
+            <ac:picMk id="6" creationId="{5A233545-5E78-40BF-888B-FD51E0D7CEA7}"/>
+          </ac:picMkLst>
+        </pc:picChg>
+      </pc:sldChg>
+      <pc:sldChg chg="addSp delSp modSp new del mod">
+        <pc:chgData name="Tim Böckel" userId="139bf3991ca47324" providerId="LiveId" clId="{F23E6AC7-6F80-426C-8EA5-4E59630F2B8F}" dt="2021-06-06T14:08:58.436" v="181" actId="2696"/>
+        <pc:sldMkLst>
+          <pc:docMk/>
+          <pc:sldMk cId="3570985426" sldId="269"/>
+        </pc:sldMkLst>
+        <pc:spChg chg="del">
+          <ac:chgData name="Tim Böckel" userId="139bf3991ca47324" providerId="LiveId" clId="{F23E6AC7-6F80-426C-8EA5-4E59630F2B8F}" dt="2021-06-06T14:07:50.259" v="143" actId="478"/>
+          <ac:spMkLst>
+            <pc:docMk/>
+            <pc:sldMk cId="3570985426" sldId="269"/>
+            <ac:spMk id="2" creationId="{7260FF13-6C9F-424F-A51B-9716FAACD7F9}"/>
+          </ac:spMkLst>
+        </pc:spChg>
+        <pc:spChg chg="del">
+          <ac:chgData name="Tim Böckel" userId="139bf3991ca47324" providerId="LiveId" clId="{F23E6AC7-6F80-426C-8EA5-4E59630F2B8F}" dt="2021-06-06T14:07:51.200" v="144" actId="478"/>
+          <ac:spMkLst>
+            <pc:docMk/>
+            <pc:sldMk cId="3570985426" sldId="269"/>
+            <ac:spMk id="3" creationId="{B27B290D-F22C-4544-AFF8-2BA5B1260152}"/>
+          </ac:spMkLst>
+        </pc:spChg>
+        <pc:spChg chg="add mod">
+          <ac:chgData name="Tim Böckel" userId="139bf3991ca47324" providerId="LiveId" clId="{F23E6AC7-6F80-426C-8EA5-4E59630F2B8F}" dt="2021-06-06T14:08:53.585" v="179" actId="1076"/>
+          <ac:spMkLst>
+            <pc:docMk/>
+            <pc:sldMk cId="3570985426" sldId="269"/>
+            <ac:spMk id="4" creationId="{6CCCF1C0-4AD0-49F2-A932-30EC74B3C26B}"/>
+          </ac:spMkLst>
+        </pc:spChg>
+      </pc:sldChg>
+      <pc:sldChg chg="addSp delSp modSp new mod">
+        <pc:chgData name="Tim Böckel" userId="139bf3991ca47324" providerId="LiveId" clId="{F23E6AC7-6F80-426C-8EA5-4E59630F2B8F}" dt="2021-06-06T14:21:12.528" v="554" actId="20577"/>
+        <pc:sldMkLst>
+          <pc:docMk/>
+          <pc:sldMk cId="3896673891" sldId="269"/>
+        </pc:sldMkLst>
+        <pc:spChg chg="mod">
+          <ac:chgData name="Tim Böckel" userId="139bf3991ca47324" providerId="LiveId" clId="{F23E6AC7-6F80-426C-8EA5-4E59630F2B8F}" dt="2021-06-06T14:09:14.314" v="222" actId="122"/>
+          <ac:spMkLst>
+            <pc:docMk/>
+            <pc:sldMk cId="3896673891" sldId="269"/>
+            <ac:spMk id="2" creationId="{93AB6214-F72C-42B4-AF25-320D7F2711BE}"/>
+          </ac:spMkLst>
+        </pc:spChg>
+        <pc:spChg chg="del">
+          <ac:chgData name="Tim Böckel" userId="139bf3991ca47324" providerId="LiveId" clId="{F23E6AC7-6F80-426C-8EA5-4E59630F2B8F}" dt="2021-06-06T14:09:16.157" v="223" actId="478"/>
+          <ac:spMkLst>
+            <pc:docMk/>
+            <pc:sldMk cId="3896673891" sldId="269"/>
+            <ac:spMk id="3" creationId="{FEEC5FA2-FE67-4A2D-9570-EF009676D540}"/>
+          </ac:spMkLst>
+        </pc:spChg>
+        <pc:spChg chg="add mod">
+          <ac:chgData name="Tim Böckel" userId="139bf3991ca47324" providerId="LiveId" clId="{F23E6AC7-6F80-426C-8EA5-4E59630F2B8F}" dt="2021-06-06T14:21:12.528" v="554" actId="20577"/>
+          <ac:spMkLst>
+            <pc:docMk/>
+            <pc:sldMk cId="3896673891" sldId="269"/>
+            <ac:spMk id="4" creationId="{BFC8FF42-606B-4FDA-8ED7-0A28C6A5EAEE}"/>
+          </ac:spMkLst>
+        </pc:spChg>
+      </pc:sldChg>
+      <pc:sldChg chg="add del">
+        <pc:chgData name="Tim Böckel" userId="139bf3991ca47324" providerId="LiveId" clId="{F23E6AC7-6F80-426C-8EA5-4E59630F2B8F}" dt="2021-06-06T14:09:00.268" v="182" actId="2696"/>
+        <pc:sldMkLst>
+          <pc:docMk/>
+          <pc:sldMk cId="2665068564" sldId="270"/>
+        </pc:sldMkLst>
+      </pc:sldChg>
+      <pc:sldChg chg="addSp delSp modSp new mod setBg">
+        <pc:chgData name="Tim Böckel" userId="139bf3991ca47324" providerId="LiveId" clId="{F23E6AC7-6F80-426C-8EA5-4E59630F2B8F}" dt="2021-06-06T15:00:33.333" v="671"/>
+        <pc:sldMkLst>
+          <pc:docMk/>
+          <pc:sldMk cId="3655628678" sldId="270"/>
+        </pc:sldMkLst>
+        <pc:spChg chg="del">
+          <ac:chgData name="Tim Böckel" userId="139bf3991ca47324" providerId="LiveId" clId="{F23E6AC7-6F80-426C-8EA5-4E59630F2B8F}" dt="2021-06-06T14:12:48.421" v="305" actId="478"/>
+          <ac:spMkLst>
+            <pc:docMk/>
+            <pc:sldMk cId="3655628678" sldId="270"/>
+            <ac:spMk id="2" creationId="{52B2415D-25BE-41C2-A6E1-80D5D9E03438}"/>
+          </ac:spMkLst>
+        </pc:spChg>
+        <pc:spChg chg="del">
+          <ac:chgData name="Tim Böckel" userId="139bf3991ca47324" providerId="LiveId" clId="{F23E6AC7-6F80-426C-8EA5-4E59630F2B8F}" dt="2021-06-06T14:12:49.372" v="306" actId="478"/>
+          <ac:spMkLst>
+            <pc:docMk/>
+            <pc:sldMk cId="3655628678" sldId="270"/>
+            <ac:spMk id="3" creationId="{AF638B73-412D-4C54-BC6F-D859C6F9DCAC}"/>
+          </ac:spMkLst>
+        </pc:spChg>
+        <pc:spChg chg="add mod">
+          <ac:chgData name="Tim Böckel" userId="139bf3991ca47324" providerId="LiveId" clId="{F23E6AC7-6F80-426C-8EA5-4E59630F2B8F}" dt="2021-06-06T14:16:04.792" v="387" actId="14100"/>
+          <ac:spMkLst>
+            <pc:docMk/>
+            <pc:sldMk cId="3655628678" sldId="270"/>
+            <ac:spMk id="6" creationId="{01C58C85-BCBE-4909-9C5D-E26A2098655F}"/>
+          </ac:spMkLst>
+        </pc:spChg>
+        <pc:spChg chg="add mod">
+          <ac:chgData name="Tim Böckel" userId="139bf3991ca47324" providerId="LiveId" clId="{F23E6AC7-6F80-426C-8EA5-4E59630F2B8F}" dt="2021-06-06T15:00:33.333" v="671"/>
+          <ac:spMkLst>
+            <pc:docMk/>
+            <pc:sldMk cId="3655628678" sldId="270"/>
+            <ac:spMk id="10" creationId="{9698E440-BE12-4561-8C38-7946C1C4437A}"/>
+          </ac:spMkLst>
+        </pc:spChg>
+        <pc:spChg chg="add">
+          <ac:chgData name="Tim Böckel" userId="139bf3991ca47324" providerId="LiveId" clId="{F23E6AC7-6F80-426C-8EA5-4E59630F2B8F}" dt="2021-06-06T14:14:49.066" v="360" actId="26606"/>
+          <ac:spMkLst>
+            <pc:docMk/>
+            <pc:sldMk cId="3655628678" sldId="270"/>
+            <ac:spMk id="11" creationId="{275D6C10-B5A7-4715-803E-0501C9C2CC21}"/>
+          </ac:spMkLst>
+        </pc:spChg>
+        <pc:picChg chg="add mod ord">
+          <ac:chgData name="Tim Böckel" userId="139bf3991ca47324" providerId="LiveId" clId="{F23E6AC7-6F80-426C-8EA5-4E59630F2B8F}" dt="2021-06-06T14:16:01.337" v="386" actId="1076"/>
+          <ac:picMkLst>
+            <pc:docMk/>
+            <pc:sldMk cId="3655628678" sldId="270"/>
+            <ac:picMk id="5" creationId="{5DAEE5F1-FAC7-4B7A-8296-5CF5CCDF289A}"/>
+          </ac:picMkLst>
+        </pc:picChg>
+      </pc:sldChg>
+      <pc:sldChg chg="addSp delSp modSp new mod setBg">
+        <pc:chgData name="Tim Böckel" userId="139bf3991ca47324" providerId="LiveId" clId="{F23E6AC7-6F80-426C-8EA5-4E59630F2B8F}" dt="2021-06-06T15:00:30.466" v="670" actId="1076"/>
+        <pc:sldMkLst>
+          <pc:docMk/>
+          <pc:sldMk cId="204137321" sldId="271"/>
+        </pc:sldMkLst>
+        <pc:spChg chg="del">
+          <ac:chgData name="Tim Böckel" userId="139bf3991ca47324" providerId="LiveId" clId="{F23E6AC7-6F80-426C-8EA5-4E59630F2B8F}" dt="2021-06-06T14:14:01.504" v="314" actId="478"/>
+          <ac:spMkLst>
+            <pc:docMk/>
+            <pc:sldMk cId="204137321" sldId="271"/>
+            <ac:spMk id="2" creationId="{D7209129-4F68-4425-95B4-0D03241CE183}"/>
+          </ac:spMkLst>
+        </pc:spChg>
+        <pc:spChg chg="del">
+          <ac:chgData name="Tim Böckel" userId="139bf3991ca47324" providerId="LiveId" clId="{F23E6AC7-6F80-426C-8EA5-4E59630F2B8F}" dt="2021-06-06T14:14:03.278" v="315" actId="478"/>
+          <ac:spMkLst>
+            <pc:docMk/>
+            <pc:sldMk cId="204137321" sldId="271"/>
+            <ac:spMk id="3" creationId="{B1CA6D6A-97D6-47C1-818A-7EFF0CA16EEF}"/>
+          </ac:spMkLst>
+        </pc:spChg>
+        <pc:spChg chg="add mod">
+          <ac:chgData name="Tim Böckel" userId="139bf3991ca47324" providerId="LiveId" clId="{F23E6AC7-6F80-426C-8EA5-4E59630F2B8F}" dt="2021-06-06T14:16:13.326" v="388" actId="1076"/>
+          <ac:spMkLst>
+            <pc:docMk/>
+            <pc:sldMk cId="204137321" sldId="271"/>
+            <ac:spMk id="8" creationId="{B54F0835-4FEF-41F7-A495-95B8EB1BF68F}"/>
+          </ac:spMkLst>
+        </pc:spChg>
+        <pc:spChg chg="add mod">
+          <ac:chgData name="Tim Böckel" userId="139bf3991ca47324" providerId="LiveId" clId="{F23E6AC7-6F80-426C-8EA5-4E59630F2B8F}" dt="2021-06-06T15:00:30.466" v="670" actId="1076"/>
+          <ac:spMkLst>
+            <pc:docMk/>
+            <pc:sldMk cId="204137321" sldId="271"/>
+            <ac:spMk id="9" creationId="{866D32DA-F96B-4064-812B-2FB15411BFC5}"/>
+          </ac:spMkLst>
+        </pc:spChg>
+        <pc:spChg chg="add del">
+          <ac:chgData name="Tim Böckel" userId="139bf3991ca47324" providerId="LiveId" clId="{F23E6AC7-6F80-426C-8EA5-4E59630F2B8F}" dt="2021-06-06T14:14:19.466" v="322" actId="26606"/>
+          <ac:spMkLst>
+            <pc:docMk/>
+            <pc:sldMk cId="204137321" sldId="271"/>
+            <ac:spMk id="10" creationId="{5F879AC3-D4CE-493C-ADC7-06205677F4F8}"/>
+          </ac:spMkLst>
+        </pc:spChg>
+        <pc:spChg chg="add del">
+          <ac:chgData name="Tim Böckel" userId="139bf3991ca47324" providerId="LiveId" clId="{F23E6AC7-6F80-426C-8EA5-4E59630F2B8F}" dt="2021-06-06T14:14:19.466" v="322" actId="26606"/>
+          <ac:spMkLst>
+            <pc:docMk/>
+            <pc:sldMk cId="204137321" sldId="271"/>
+            <ac:spMk id="12" creationId="{736F0DFD-0954-464F-BF12-DD2E6F6E0380}"/>
+          </ac:spMkLst>
+        </pc:spChg>
+        <pc:spChg chg="add">
+          <ac:chgData name="Tim Böckel" userId="139bf3991ca47324" providerId="LiveId" clId="{F23E6AC7-6F80-426C-8EA5-4E59630F2B8F}" dt="2021-06-06T14:15:08.602" v="381" actId="26606"/>
+          <ac:spMkLst>
+            <pc:docMk/>
+            <pc:sldMk cId="204137321" sldId="271"/>
+            <ac:spMk id="13" creationId="{275D6C10-B5A7-4715-803E-0501C9C2CC21}"/>
+          </ac:spMkLst>
+        </pc:spChg>
+        <pc:picChg chg="add mod ord">
+          <ac:chgData name="Tim Böckel" userId="139bf3991ca47324" providerId="LiveId" clId="{F23E6AC7-6F80-426C-8EA5-4E59630F2B8F}" dt="2021-06-06T14:20:42.708" v="552" actId="14100"/>
+          <ac:picMkLst>
+            <pc:docMk/>
+            <pc:sldMk cId="204137321" sldId="271"/>
+            <ac:picMk id="5" creationId="{F86E3232-7956-455B-9743-D855EFB474F5}"/>
+          </ac:picMkLst>
+        </pc:picChg>
+      </pc:sldChg>
+      <pc:sldChg chg="addSp delSp modSp new mod">
+        <pc:chgData name="Tim Böckel" userId="139bf3991ca47324" providerId="LiveId" clId="{F23E6AC7-6F80-426C-8EA5-4E59630F2B8F}" dt="2021-06-06T14:59:45.803" v="664"/>
+        <pc:sldMkLst>
+          <pc:docMk/>
+          <pc:sldMk cId="1748375574" sldId="272"/>
+        </pc:sldMkLst>
+        <pc:spChg chg="add del mod">
+          <ac:chgData name="Tim Böckel" userId="139bf3991ca47324" providerId="LiveId" clId="{F23E6AC7-6F80-426C-8EA5-4E59630F2B8F}" dt="2021-06-06T14:16:46.290" v="411" actId="20577"/>
+          <ac:spMkLst>
+            <pc:docMk/>
+            <pc:sldMk cId="1748375574" sldId="272"/>
+            <ac:spMk id="2" creationId="{042B9283-03AE-42DC-860F-F2598CB07825}"/>
+          </ac:spMkLst>
+        </pc:spChg>
+        <pc:spChg chg="mod">
+          <ac:chgData name="Tim Böckel" userId="139bf3991ca47324" providerId="LiveId" clId="{F23E6AC7-6F80-426C-8EA5-4E59630F2B8F}" dt="2021-06-06T14:59:45.803" v="664"/>
+          <ac:spMkLst>
+            <pc:docMk/>
+            <pc:sldMk cId="1748375574" sldId="272"/>
+            <ac:spMk id="3" creationId="{2C9AF1AA-4E5A-4589-8C72-1BF8C40BD4E7}"/>
+          </ac:spMkLst>
+        </pc:spChg>
+      </pc:sldChg>
+      <pc:sldChg chg="addSp delSp modSp new mod">
+        <pc:chgData name="Tim Böckel" userId="139bf3991ca47324" providerId="LiveId" clId="{F23E6AC7-6F80-426C-8EA5-4E59630F2B8F}" dt="2021-06-06T14:20:04.958" v="548" actId="20577"/>
+        <pc:sldMkLst>
+          <pc:docMk/>
+          <pc:sldMk cId="3298032880" sldId="273"/>
+        </pc:sldMkLst>
+        <pc:spChg chg="mod">
+          <ac:chgData name="Tim Böckel" userId="139bf3991ca47324" providerId="LiveId" clId="{F23E6AC7-6F80-426C-8EA5-4E59630F2B8F}" dt="2021-06-06T14:16:54.129" v="427" actId="20577"/>
+          <ac:spMkLst>
+            <pc:docMk/>
+            <pc:sldMk cId="3298032880" sldId="273"/>
+            <ac:spMk id="2" creationId="{EB32BDE4-8705-4DE5-B76B-E01435DCDC1C}"/>
+          </ac:spMkLst>
+        </pc:spChg>
+        <pc:spChg chg="del">
+          <ac:chgData name="Tim Böckel" userId="139bf3991ca47324" providerId="LiveId" clId="{F23E6AC7-6F80-426C-8EA5-4E59630F2B8F}" dt="2021-06-06T14:16:56.611" v="428" actId="478"/>
+          <ac:spMkLst>
+            <pc:docMk/>
+            <pc:sldMk cId="3298032880" sldId="273"/>
+            <ac:spMk id="3" creationId="{33F588E0-F1D1-4ECE-9AFC-B589F3CDC19A}"/>
+          </ac:spMkLst>
+        </pc:spChg>
+        <pc:spChg chg="add mod">
+          <ac:chgData name="Tim Böckel" userId="139bf3991ca47324" providerId="LiveId" clId="{F23E6AC7-6F80-426C-8EA5-4E59630F2B8F}" dt="2021-06-06T14:20:04.958" v="548" actId="20577"/>
+          <ac:spMkLst>
+            <pc:docMk/>
+            <pc:sldMk cId="3298032880" sldId="273"/>
+            <ac:spMk id="4" creationId="{D3913042-6E3C-4BAE-9222-9464FF4BF8ED}"/>
+          </ac:spMkLst>
+        </pc:spChg>
       </pc:sldChg>
     </pc:docChg>
   </pc:docChgLst>
@@ -986,6 +1535,20 @@
 </p:cmLst>
 </file>
 
+<file path=ppt/comments/comment5.xml><?xml version="1.0" encoding="utf-8"?>
+<p:cmLst xmlns:a="http://schemas.openxmlformats.org/drawingml/2006/main" xmlns:r="http://schemas.openxmlformats.org/officeDocument/2006/relationships" xmlns:p="http://schemas.openxmlformats.org/presentationml/2006/main">
+  <p:cm authorId="1" dt="2021-06-06T16:02:57.356" idx="8">
+    <p:pos x="10" y="10"/>
+    <p:text/>
+    <p:extLst>
+      <p:ext uri="{C676402C-5697-4E1C-873F-D02D1690AC5C}">
+        <p15:threadingInfo xmlns:p15="http://schemas.microsoft.com/office/powerpoint/2012/main" timeZoneBias="-120"/>
+      </p:ext>
+    </p:extLst>
+  </p:cm>
+</p:cmLst>
+</file>
+
 <file path=ppt/notesMasters/notesMaster1.xml><?xml version="1.0" encoding="utf-8"?>
 <p:notesMaster xmlns:a="http://schemas.openxmlformats.org/drawingml/2006/main" xmlns:r="http://schemas.openxmlformats.org/officeDocument/2006/relationships" xmlns:p="http://schemas.openxmlformats.org/presentationml/2006/main">
   <p:cSld>
@@ -1068,7 +1631,7 @@
           <a:p>
             <a:fld id="{7C2F76F7-C034-4697-B278-6F74D2DBBFE9}" type="datetimeFigureOut">
               <a:rPr lang="de-DE" smtClean="0"/>
-              <a:t>05.06.2021</a:t>
+              <a:t>06.06.2021</a:t>
             </a:fld>
             <a:endParaRPr lang="de-DE"/>
           </a:p>
@@ -1480,9 +2043,9 @@
           <a:bodyPr/>
           <a:lstStyle/>
           <a:p>
-            <a:fld id="{F1D70348-9B4E-43DC-96B8-04F1ED432CA8}" type="datetimeFigureOut">
+            <a:fld id="{17C00E64-5C16-42B5-9904-0AE197F57232}" type="datetime1">
               <a:rPr lang="de-DE" smtClean="0"/>
-              <a:t>05.06.2021</a:t>
+              <a:t>06.06.2021</a:t>
             </a:fld>
             <a:endParaRPr lang="de-DE"/>
           </a:p>
@@ -1678,9 +2241,9 @@
           <a:bodyPr/>
           <a:lstStyle/>
           <a:p>
-            <a:fld id="{F1D70348-9B4E-43DC-96B8-04F1ED432CA8}" type="datetimeFigureOut">
+            <a:fld id="{4A6C0110-7729-4D3B-9603-F69B680D5E6E}" type="datetime1">
               <a:rPr lang="de-DE" smtClean="0"/>
-              <a:t>05.06.2021</a:t>
+              <a:t>06.06.2021</a:t>
             </a:fld>
             <a:endParaRPr lang="de-DE"/>
           </a:p>
@@ -1886,9 +2449,9 @@
           <a:bodyPr/>
           <a:lstStyle/>
           <a:p>
-            <a:fld id="{F1D70348-9B4E-43DC-96B8-04F1ED432CA8}" type="datetimeFigureOut">
+            <a:fld id="{2B2562E4-7120-4BA1-B2F9-A0C9C38E51CE}" type="datetime1">
               <a:rPr lang="de-DE" smtClean="0"/>
-              <a:t>05.06.2021</a:t>
+              <a:t>06.06.2021</a:t>
             </a:fld>
             <a:endParaRPr lang="de-DE"/>
           </a:p>
@@ -2084,9 +2647,9 @@
           <a:bodyPr/>
           <a:lstStyle/>
           <a:p>
-            <a:fld id="{F1D70348-9B4E-43DC-96B8-04F1ED432CA8}" type="datetimeFigureOut">
+            <a:fld id="{3109F62F-2DA5-485B-A203-92CD96D98FD4}" type="datetime1">
               <a:rPr lang="de-DE" smtClean="0"/>
-              <a:t>05.06.2021</a:t>
+              <a:t>06.06.2021</a:t>
             </a:fld>
             <a:endParaRPr lang="de-DE"/>
           </a:p>
@@ -2359,9 +2922,9 @@
           <a:bodyPr/>
           <a:lstStyle/>
           <a:p>
-            <a:fld id="{F1D70348-9B4E-43DC-96B8-04F1ED432CA8}" type="datetimeFigureOut">
+            <a:fld id="{8AD3ECF5-957F-44B6-86C1-AF74B8837FFD}" type="datetime1">
               <a:rPr lang="de-DE" smtClean="0"/>
-              <a:t>05.06.2021</a:t>
+              <a:t>06.06.2021</a:t>
             </a:fld>
             <a:endParaRPr lang="de-DE"/>
           </a:p>
@@ -2624,9 +3187,9 @@
           <a:bodyPr/>
           <a:lstStyle/>
           <a:p>
-            <a:fld id="{F1D70348-9B4E-43DC-96B8-04F1ED432CA8}" type="datetimeFigureOut">
+            <a:fld id="{F68A17FD-0F90-482D-8BCC-B5E1C7E64A83}" type="datetime1">
               <a:rPr lang="de-DE" smtClean="0"/>
-              <a:t>05.06.2021</a:t>
+              <a:t>06.06.2021</a:t>
             </a:fld>
             <a:endParaRPr lang="de-DE"/>
           </a:p>
@@ -3036,9 +3599,9 @@
           <a:bodyPr/>
           <a:lstStyle/>
           <a:p>
-            <a:fld id="{F1D70348-9B4E-43DC-96B8-04F1ED432CA8}" type="datetimeFigureOut">
+            <a:fld id="{74147AE6-904F-4028-8B92-C7DCE538CC58}" type="datetime1">
               <a:rPr lang="de-DE" smtClean="0"/>
-              <a:t>05.06.2021</a:t>
+              <a:t>06.06.2021</a:t>
             </a:fld>
             <a:endParaRPr lang="de-DE"/>
           </a:p>
@@ -3177,9 +3740,9 @@
           <a:bodyPr/>
           <a:lstStyle/>
           <a:p>
-            <a:fld id="{F1D70348-9B4E-43DC-96B8-04F1ED432CA8}" type="datetimeFigureOut">
+            <a:fld id="{22A908A4-CD3B-406C-8EA4-C1B6D6DD7A7A}" type="datetime1">
               <a:rPr lang="de-DE" smtClean="0"/>
-              <a:t>05.06.2021</a:t>
+              <a:t>06.06.2021</a:t>
             </a:fld>
             <a:endParaRPr lang="de-DE"/>
           </a:p>
@@ -3290,9 +3853,9 @@
           <a:bodyPr/>
           <a:lstStyle/>
           <a:p>
-            <a:fld id="{F1D70348-9B4E-43DC-96B8-04F1ED432CA8}" type="datetimeFigureOut">
+            <a:fld id="{B02A6882-A0E3-4ED1-9504-4082CE58B939}" type="datetime1">
               <a:rPr lang="de-DE" smtClean="0"/>
-              <a:t>05.06.2021</a:t>
+              <a:t>06.06.2021</a:t>
             </a:fld>
             <a:endParaRPr lang="de-DE"/>
           </a:p>
@@ -3601,9 +4164,9 @@
           <a:bodyPr/>
           <a:lstStyle/>
           <a:p>
-            <a:fld id="{F1D70348-9B4E-43DC-96B8-04F1ED432CA8}" type="datetimeFigureOut">
+            <a:fld id="{75BB3244-A09F-473D-B679-256137A18B7E}" type="datetime1">
               <a:rPr lang="de-DE" smtClean="0"/>
-              <a:t>05.06.2021</a:t>
+              <a:t>06.06.2021</a:t>
             </a:fld>
             <a:endParaRPr lang="de-DE"/>
           </a:p>
@@ -3889,9 +4452,9 @@
           <a:bodyPr/>
           <a:lstStyle/>
           <a:p>
-            <a:fld id="{F1D70348-9B4E-43DC-96B8-04F1ED432CA8}" type="datetimeFigureOut">
+            <a:fld id="{13014F91-6D4E-4F1E-A9DF-C3C70839EE92}" type="datetime1">
               <a:rPr lang="de-DE" smtClean="0"/>
-              <a:t>05.06.2021</a:t>
+              <a:t>06.06.2021</a:t>
             </a:fld>
             <a:endParaRPr lang="de-DE"/>
           </a:p>
@@ -4130,9 +4693,9 @@
             </a:lvl1pPr>
           </a:lstStyle>
           <a:p>
-            <a:fld id="{F1D70348-9B4E-43DC-96B8-04F1ED432CA8}" type="datetimeFigureOut">
+            <a:fld id="{DDC3D18B-32BD-4C85-8AD7-78C16C3FB3D9}" type="datetime1">
               <a:rPr lang="de-DE" smtClean="0"/>
-              <a:t>05.06.2021</a:t>
+              <a:t>06.06.2021</a:t>
             </a:fld>
             <a:endParaRPr lang="de-DE"/>
           </a:p>
@@ -4249,6 +4812,7 @@
     <p:sldLayoutId id="2147483658" r:id="rId10"/>
     <p:sldLayoutId id="2147483659" r:id="rId11"/>
   </p:sldLayoutIdLst>
+  <p:hf sldNum="0" hdr="0" ftr="0" dt="0"/>
   <p:txStyles>
     <p:titleStyle>
       <a:lvl1pPr algn="l" defTabSz="914400" rtl="0" eaLnBrk="1" latinLnBrk="0" hangingPunct="1">
@@ -4828,41 +5392,6 @@
           </a:p>
         </p:txBody>
       </p:sp>
-      <p:sp>
-        <p:nvSpPr>
-          <p:cNvPr id="6" name="Textfeld 5">
-            <a:extLst>
-              <a:ext uri="{FF2B5EF4-FFF2-40B4-BE49-F238E27FC236}">
-                <a16:creationId xmlns:a16="http://schemas.microsoft.com/office/drawing/2014/main" id="{6EF0713A-87F1-4C81-8331-DD272A13DC97}"/>
-              </a:ext>
-            </a:extLst>
-          </p:cNvPr>
-          <p:cNvSpPr txBox="1"/>
-          <p:nvPr/>
-        </p:nvSpPr>
-        <p:spPr>
-          <a:xfrm>
-            <a:off x="855677" y="6157519"/>
-            <a:ext cx="7066978" cy="646331"/>
-          </a:xfrm>
-          <a:prstGeom prst="rect">
-            <a:avLst/>
-          </a:prstGeom>
-          <a:noFill/>
-        </p:spPr>
-        <p:txBody>
-          <a:bodyPr wrap="square" rtlCol="0">
-            <a:spAutoFit/>
-          </a:bodyPr>
-          <a:lstStyle/>
-          <a:p>
-            <a:r>
-              <a:rPr lang="de-DE" dirty="0"/>
-              <a:t>Bild: https://www.digitalradar-muensterland.de/eine-customer-journey-map-erstellen/</a:t>
-            </a:r>
-          </a:p>
-        </p:txBody>
-      </p:sp>
     </p:spTree>
     <p:extLst>
       <p:ext uri="{BB962C8B-B14F-4D97-AF65-F5344CB8AC3E}">
@@ -4898,7 +5427,7 @@
           <p:cNvPr id="2" name="Titel 1">
             <a:extLst>
               <a:ext uri="{FF2B5EF4-FFF2-40B4-BE49-F238E27FC236}">
-                <a16:creationId xmlns:a16="http://schemas.microsoft.com/office/drawing/2014/main" id="{7A192B9F-EBFA-4972-A930-6BB6E58FFF3D}"/>
+                <a16:creationId xmlns:a16="http://schemas.microsoft.com/office/drawing/2014/main" id="{93AB6214-F72C-42B4-AF25-320D7F2711BE}"/>
               </a:ext>
             </a:extLst>
           </p:cNvPr>
@@ -4916,91 +5445,45 @@
           <a:p>
             <a:pPr algn="ctr"/>
             <a:r>
-              <a:rPr lang="de-DE" dirty="0"/>
-              <a:t>Vorteile</a:t>
-            </a:r>
-          </a:p>
-        </p:txBody>
-      </p:sp>
-      <p:sp>
-        <p:nvSpPr>
-          <p:cNvPr id="3" name="Inhaltsplatzhalter 2">
-            <a:extLst>
-              <a:ext uri="{FF2B5EF4-FFF2-40B4-BE49-F238E27FC236}">
-                <a16:creationId xmlns:a16="http://schemas.microsoft.com/office/drawing/2014/main" id="{68AF4279-EE49-4CBE-A19A-AA481D02B38D}"/>
-              </a:ext>
-            </a:extLst>
-          </p:cNvPr>
-          <p:cNvSpPr>
-            <a:spLocks noGrp="1"/>
-          </p:cNvSpPr>
-          <p:nvPr>
-            <p:ph idx="1"/>
-          </p:nvPr>
+              <a:rPr lang="en-US" dirty="0" err="1"/>
+              <a:t>Entwicklung</a:t>
+            </a:r>
+            <a:r>
+              <a:rPr lang="en-US" dirty="0"/>
+              <a:t> der </a:t>
+            </a:r>
+            <a:r>
+              <a:rPr lang="en-US" dirty="0" err="1"/>
+              <a:t>vertikalen</a:t>
+            </a:r>
+            <a:r>
+              <a:rPr lang="en-US" dirty="0"/>
+              <a:t> </a:t>
+            </a:r>
+            <a:r>
+              <a:rPr lang="en-US" dirty="0" err="1"/>
+              <a:t>Achse</a:t>
+            </a:r>
+            <a:endParaRPr lang="en-US" dirty="0"/>
+          </a:p>
+        </p:txBody>
+      </p:sp>
+      <p:sp>
+        <p:nvSpPr>
+          <p:cNvPr id="4" name="Textfeld 3">
+            <a:extLst>
+              <a:ext uri="{FF2B5EF4-FFF2-40B4-BE49-F238E27FC236}">
+                <a16:creationId xmlns:a16="http://schemas.microsoft.com/office/drawing/2014/main" id="{BFC8FF42-606B-4FDA-8ED7-0A28C6A5EAEE}"/>
+              </a:ext>
+            </a:extLst>
+          </p:cNvPr>
+          <p:cNvSpPr txBox="1"/>
+          <p:nvPr/>
         </p:nvSpPr>
         <p:spPr>
           <a:xfrm>
-            <a:off x="914400" y="1825625"/>
-            <a:ext cx="10439400" cy="3643997"/>
-          </a:xfrm>
-        </p:spPr>
-        <p:txBody>
-          <a:bodyPr/>
-          <a:lstStyle/>
-          <a:p>
-            <a:pPr algn="l"/>
-            <a:r>
-              <a:rPr lang="de-DE" sz="1800" dirty="0">
-                <a:latin typeface="Minion-Regular"/>
-              </a:rPr>
-              <a:t>Kundengetriebener Designprozess</a:t>
-            </a:r>
-          </a:p>
-          <a:p>
-            <a:pPr algn="l"/>
-            <a:r>
-              <a:rPr lang="de-DE" sz="1800" dirty="0">
-                <a:latin typeface="Minion-Regular"/>
-              </a:rPr>
-              <a:t>Sehr flexibel einsetzbar</a:t>
-            </a:r>
-          </a:p>
-          <a:p>
-            <a:pPr algn="l"/>
-            <a:r>
-              <a:rPr lang="de-DE" sz="1800" dirty="0">
-                <a:latin typeface="Minion-Regular"/>
-              </a:rPr>
-              <a:t>CJMs ermöglichen ein besseres Verständnis für die Komplexität des Produkt-Ökosystems</a:t>
-            </a:r>
-          </a:p>
-          <a:p>
-            <a:pPr algn="l"/>
-            <a:r>
-              <a:rPr lang="de-DE" sz="1800" dirty="0">
-                <a:latin typeface="Minion-Regular"/>
-              </a:rPr>
-              <a:t>Durch die Einbeziehung der Emotionen und Denkprozesse der tatsächlichen Kunden kann die Analyse über die üblichen quantitativen Daten</a:t>
-            </a:r>
-          </a:p>
-        </p:txBody>
-      </p:sp>
-      <p:sp>
-        <p:nvSpPr>
-          <p:cNvPr id="4" name="Textfeld 3">
-            <a:extLst>
-              <a:ext uri="{FF2B5EF4-FFF2-40B4-BE49-F238E27FC236}">
-                <a16:creationId xmlns:a16="http://schemas.microsoft.com/office/drawing/2014/main" id="{EAF14A32-A629-45EB-9B55-508FBB5D14D7}"/>
-              </a:ext>
-            </a:extLst>
-          </p:cNvPr>
-          <p:cNvSpPr txBox="1"/>
-          <p:nvPr/>
-        </p:nvSpPr>
-        <p:spPr>
-          <a:xfrm>
-            <a:off x="1098958" y="5981350"/>
-            <a:ext cx="9286613" cy="646331"/>
+            <a:off x="973122" y="1690688"/>
+            <a:ext cx="9756397" cy="4524315"/>
           </a:xfrm>
           <a:prstGeom prst="rect">
             <a:avLst/>
@@ -5014,17 +5497,806 @@
           <a:lstStyle/>
           <a:p>
             <a:r>
-              <a:rPr lang="de-DE" dirty="0"/>
-              <a:t>Aus: </a:t>
-            </a:r>
-            <a:r>
-              <a:rPr lang="en-US" dirty="0"/>
-              <a:t>Evaluating Customer Experience through Customer Journey Mapping and Service Blueprinting at Edmonton Public Library An Exploratory Study</a:t>
-            </a:r>
-            <a:endParaRPr lang="de-DE" dirty="0"/>
-          </a:p>
-        </p:txBody>
-      </p:sp>
+              <a:rPr lang="de-DE" sz="1800" b="0" i="0" u="none" strike="noStrike" baseline="0" dirty="0">
+                <a:solidFill>
+                  <a:srgbClr val="000000"/>
+                </a:solidFill>
+                <a:latin typeface="JMFCF E+ Adv T T 7f 5838b 0. I"/>
+              </a:rPr>
+              <a:t>Anforderungen des Users: Die Anforderungen des Kunden, die am Touchpoint (Marketing) benötigt werden.</a:t>
+            </a:r>
+          </a:p>
+          <a:p>
+            <a:endParaRPr lang="de-DE" sz="1800" b="0" i="0" u="none" strike="noStrike" baseline="0" dirty="0">
+              <a:solidFill>
+                <a:srgbClr val="000000"/>
+              </a:solidFill>
+              <a:latin typeface="JMFCF E+ Adv T T 7f 5838b 0. I"/>
+            </a:endParaRPr>
+          </a:p>
+          <a:p>
+            <a:r>
+              <a:rPr lang="de-DE" sz="1800" b="0" i="0" u="none" strike="noStrike" baseline="0" dirty="0">
+                <a:solidFill>
+                  <a:srgbClr val="000000"/>
+                </a:solidFill>
+                <a:latin typeface="JMFCF E+ Adv T T 7f 5838b 0. I"/>
+              </a:rPr>
+              <a:t>Mitarbeiter-Aktionen: </a:t>
+            </a:r>
+            <a:r>
+              <a:rPr lang="de-DE" dirty="0">
+                <a:solidFill>
+                  <a:srgbClr val="000000"/>
+                </a:solidFill>
+                <a:latin typeface="JMFCF E+ Adv T T 7f 5838b 0. I"/>
+              </a:rPr>
+              <a:t>D</a:t>
+            </a:r>
+            <a:r>
+              <a:rPr lang="de-DE" sz="1800" b="0" i="0" u="none" strike="noStrike" baseline="0" dirty="0">
+                <a:solidFill>
+                  <a:srgbClr val="000000"/>
+                </a:solidFill>
+                <a:latin typeface="JMFCF E+ Adv T T 7f 5838b 0. I"/>
+              </a:rPr>
+              <a:t>ie Aktionen der Mall-Mitarbeiter, die am Touchpoint erforderlich sind, um die Kundenanforderungen zu erfüllen (Personalwesen).</a:t>
+            </a:r>
+          </a:p>
+          <a:p>
+            <a:endParaRPr lang="de-DE" dirty="0">
+              <a:solidFill>
+                <a:srgbClr val="000000"/>
+              </a:solidFill>
+              <a:latin typeface="JMFCF E+ Adv T T 7f 5838b 0. I"/>
+            </a:endParaRPr>
+          </a:p>
+          <a:p>
+            <a:r>
+              <a:rPr lang="de-DE" sz="1800" b="0" i="0" u="none" strike="noStrike" baseline="0" dirty="0">
+                <a:solidFill>
+                  <a:srgbClr val="000000"/>
+                </a:solidFill>
+                <a:latin typeface="JMFCF E+ Adv T T 7f 5838b 0. I"/>
+              </a:rPr>
+              <a:t>Mitarbeiterunterstützung: Geben Sie an, welche Schulungen, Informationstechnologien, Lizenzen, Zertifizierungen, Werkzeuge, Materialien usw. die Mitarbeiter des Einkaufszentrums benötigen, um die Anforderungen am Touchpoint zu erfüllen (Personalwesen und Betriebsmanagement).</a:t>
+            </a:r>
+          </a:p>
+          <a:p>
+            <a:endParaRPr lang="de-DE" dirty="0">
+              <a:solidFill>
+                <a:srgbClr val="000000"/>
+              </a:solidFill>
+              <a:latin typeface="JMFCF E+ Adv T T 7f 5838b 0. I"/>
+            </a:endParaRPr>
+          </a:p>
+          <a:p>
+            <a:r>
+              <a:rPr lang="de-DE" sz="1800" b="0" i="0" u="none" strike="noStrike" baseline="0" dirty="0">
+                <a:solidFill>
+                  <a:srgbClr val="000000"/>
+                </a:solidFill>
+                <a:latin typeface="JMFCF E+ Adv T T 7f 5838b 0. I"/>
+              </a:rPr>
+              <a:t>Gestaltung des Einkaufszentrums: Spezifizieren Sie die Umgebungsreize, die Kunden an jedem Touchpoint wahrnehmen und nicht wahrnehmen sollten, um die Servicequalität zu beurteilen (Marketing, Operations</a:t>
+            </a:r>
+            <a:r>
+              <a:rPr lang="de-DE" dirty="0">
+                <a:solidFill>
+                  <a:srgbClr val="000000"/>
+                </a:solidFill>
+                <a:latin typeface="JMFCF E+ Adv T T 7f 5838b 0. I"/>
+              </a:rPr>
+              <a:t>-</a:t>
+            </a:r>
+            <a:r>
+              <a:rPr lang="de-DE" sz="1800" b="0" i="0" u="none" strike="noStrike" baseline="0" dirty="0">
+                <a:solidFill>
+                  <a:srgbClr val="000000"/>
+                </a:solidFill>
+                <a:latin typeface="JMFCF E+ Adv T T 7f 5838b 0. I"/>
+              </a:rPr>
+              <a:t>Management, Gebäudetechnik).</a:t>
+            </a:r>
+          </a:p>
+          <a:p>
+            <a:r>
+              <a:rPr lang="de-DE" sz="1800" b="0" i="0" u="none" strike="noStrike" baseline="0" dirty="0">
+                <a:solidFill>
+                  <a:srgbClr val="000000"/>
+                </a:solidFill>
+                <a:latin typeface="JMFCF E+ Adv T T 7f 5838b 0. I"/>
+              </a:rPr>
+              <a:t> </a:t>
+            </a:r>
+          </a:p>
+          <a:p>
+            <a:r>
+              <a:rPr lang="de-DE" sz="1800" b="0" i="0" u="none" strike="noStrike" baseline="0" dirty="0">
+                <a:solidFill>
+                  <a:srgbClr val="000000"/>
+                </a:solidFill>
+                <a:latin typeface="JMFCF E+ Adv T T 7f 5838b 0. I"/>
+              </a:rPr>
+              <a:t>Service-Innovation: Machen Sie ein Brainstorming, wie alle Abteilungen an jedem Touchpoint zusammenarbeiten können.</a:t>
+            </a:r>
+            <a:endParaRPr lang="en-US" dirty="0"/>
+          </a:p>
+        </p:txBody>
+      </p:sp>
+    </p:spTree>
+    <p:extLst>
+      <p:ext uri="{BB962C8B-B14F-4D97-AF65-F5344CB8AC3E}">
+        <p14:creationId xmlns:p14="http://schemas.microsoft.com/office/powerpoint/2010/main" val="3896673891"/>
+      </p:ext>
+    </p:extLst>
+  </p:cSld>
+  <p:clrMapOvr>
+    <a:masterClrMapping/>
+  </p:clrMapOvr>
+</p:sld>
+</file>
+
+<file path=ppt/slides/slide11.xml><?xml version="1.0" encoding="utf-8"?>
+<p:sld xmlns:a="http://schemas.openxmlformats.org/drawingml/2006/main" xmlns:r="http://schemas.openxmlformats.org/officeDocument/2006/relationships" xmlns:p="http://schemas.openxmlformats.org/presentationml/2006/main">
+  <p:cSld>
+    <p:bg>
+      <p:bgPr>
+        <a:solidFill>
+          <a:schemeClr val="bg1"/>
+        </a:solidFill>
+        <a:effectLst/>
+      </p:bgPr>
+    </p:bg>
+    <p:spTree>
+      <p:nvGrpSpPr>
+        <p:cNvPr id="1" name=""/>
+        <p:cNvGrpSpPr/>
+        <p:nvPr/>
+      </p:nvGrpSpPr>
+      <p:grpSpPr>
+        <a:xfrm>
+          <a:off x="0" y="0"/>
+          <a:ext cx="0" cy="0"/>
+          <a:chOff x="0" y="0"/>
+          <a:chExt cx="0" cy="0"/>
+        </a:xfrm>
+      </p:grpSpPr>
+      <p:sp useBgFill="1">
+        <p:nvSpPr>
+          <p:cNvPr id="11" name="Rectangle 10">
+            <a:extLst>
+              <a:ext uri="{FF2B5EF4-FFF2-40B4-BE49-F238E27FC236}">
+                <a16:creationId xmlns:a16="http://schemas.microsoft.com/office/drawing/2014/main" id="{275D6C10-B5A7-4715-803E-0501C9C2CC21}"/>
+              </a:ext>
+              <a:ext uri="{C183D7F6-B498-43B3-948B-1728B52AA6E4}">
+                <adec:decorative xmlns:adec="http://schemas.microsoft.com/office/drawing/2017/decorative" val="1"/>
+              </a:ext>
+            </a:extLst>
+          </p:cNvPr>
+          <p:cNvSpPr>
+            <a:spLocks noGrp="1" noRot="1" noChangeAspect="1" noMove="1" noResize="1" noEditPoints="1" noAdjustHandles="1" noChangeArrowheads="1" noChangeShapeType="1" noTextEdit="1"/>
+          </p:cNvSpPr>
+          <p:nvPr>
+            <p:extLst>
+              <p:ext uri="{386F3935-93C4-4BCD-93E2-E3B085C9AB24}">
+                <p16:designElem xmlns:p16="http://schemas.microsoft.com/office/powerpoint/2015/main" val="1"/>
+              </p:ext>
+            </p:extLst>
+          </p:nvPr>
+        </p:nvSpPr>
+        <p:spPr>
+          <a:xfrm>
+            <a:off x="-1" y="0"/>
+            <a:ext cx="12188952" cy="6858000"/>
+          </a:xfrm>
+          <a:prstGeom prst="rect">
+            <a:avLst/>
+          </a:prstGeom>
+          <a:ln>
+            <a:noFill/>
+          </a:ln>
+        </p:spPr>
+        <p:style>
+          <a:lnRef idx="2">
+            <a:schemeClr val="accent1">
+              <a:shade val="50000"/>
+            </a:schemeClr>
+          </a:lnRef>
+          <a:fillRef idx="1">
+            <a:schemeClr val="accent1"/>
+          </a:fillRef>
+          <a:effectRef idx="0">
+            <a:schemeClr val="accent1"/>
+          </a:effectRef>
+          <a:fontRef idx="minor">
+            <a:schemeClr val="lt1"/>
+          </a:fontRef>
+        </p:style>
+        <p:txBody>
+          <a:bodyPr rtlCol="0" anchor="ctr"/>
+          <a:lstStyle/>
+          <a:p>
+            <a:pPr algn="ctr"/>
+            <a:endParaRPr lang="en-US"/>
+          </a:p>
+        </p:txBody>
+      </p:sp>
+      <p:sp>
+        <p:nvSpPr>
+          <p:cNvPr id="6" name="Titel 1">
+            <a:extLst>
+              <a:ext uri="{FF2B5EF4-FFF2-40B4-BE49-F238E27FC236}">
+                <a16:creationId xmlns:a16="http://schemas.microsoft.com/office/drawing/2014/main" id="{01C58C85-BCBE-4909-9C5D-E26A2098655F}"/>
+              </a:ext>
+            </a:extLst>
+          </p:cNvPr>
+          <p:cNvSpPr>
+            <a:spLocks noGrp="1"/>
+          </p:cNvSpPr>
+          <p:nvPr>
+            <p:ph type="title"/>
+          </p:nvPr>
+        </p:nvSpPr>
+        <p:spPr>
+          <a:xfrm>
+            <a:off x="841248" y="552289"/>
+            <a:ext cx="3976496" cy="3700929"/>
+          </a:xfrm>
+        </p:spPr>
+        <p:txBody>
+          <a:bodyPr vert="horz" lIns="91440" tIns="45720" rIns="91440" bIns="45720" rtlCol="0" anchor="b">
+            <a:normAutofit/>
+          </a:bodyPr>
+          <a:lstStyle/>
+          <a:p>
+            <a:r>
+              <a:rPr lang="en-US" sz="5200" kern="1200" dirty="0">
+                <a:solidFill>
+                  <a:schemeClr val="tx1"/>
+                </a:solidFill>
+                <a:latin typeface="+mj-lt"/>
+                <a:ea typeface="+mj-ea"/>
+                <a:cs typeface="+mj-cs"/>
+              </a:rPr>
+              <a:t>Pre-Service Period</a:t>
+            </a:r>
+          </a:p>
+        </p:txBody>
+      </p:sp>
+      <p:pic>
+        <p:nvPicPr>
+          <p:cNvPr id="5" name="Grafik 4" descr="Ein Bild, das Tisch enthält.&#10;&#10;Automatisch generierte Beschreibung">
+            <a:extLst>
+              <a:ext uri="{FF2B5EF4-FFF2-40B4-BE49-F238E27FC236}">
+                <a16:creationId xmlns:a16="http://schemas.microsoft.com/office/drawing/2014/main" id="{5DAEE5F1-FAC7-4B7A-8296-5CF5CCDF289A}"/>
+              </a:ext>
+            </a:extLst>
+          </p:cNvPr>
+          <p:cNvPicPr>
+            <a:picLocks noChangeAspect="1"/>
+          </p:cNvPicPr>
+          <p:nvPr/>
+        </p:nvPicPr>
+        <p:blipFill>
+          <a:blip r:embed="rId2">
+            <a:extLst>
+              <a:ext uri="{28A0092B-C50C-407E-A947-70E740481C1C}">
+                <a14:useLocalDpi xmlns:a14="http://schemas.microsoft.com/office/drawing/2010/main" val="0"/>
+              </a:ext>
+            </a:extLst>
+          </a:blip>
+          <a:stretch>
+            <a:fillRect/>
+          </a:stretch>
+        </p:blipFill>
+        <p:spPr>
+          <a:xfrm>
+            <a:off x="5476198" y="295904"/>
+            <a:ext cx="5874554" cy="6266192"/>
+          </a:xfrm>
+          <a:prstGeom prst="rect">
+            <a:avLst/>
+          </a:prstGeom>
+        </p:spPr>
+      </p:pic>
+      <p:sp>
+        <p:nvSpPr>
+          <p:cNvPr id="10" name="Textfeld 9">
+            <a:extLst>
+              <a:ext uri="{FF2B5EF4-FFF2-40B4-BE49-F238E27FC236}">
+                <a16:creationId xmlns:a16="http://schemas.microsoft.com/office/drawing/2014/main" id="{9698E440-BE12-4561-8C38-7946C1C4437A}"/>
+              </a:ext>
+            </a:extLst>
+          </p:cNvPr>
+          <p:cNvSpPr txBox="1"/>
+          <p:nvPr/>
+        </p:nvSpPr>
+        <p:spPr>
+          <a:xfrm>
+            <a:off x="8445267" y="6595643"/>
+            <a:ext cx="3073866" cy="246221"/>
+          </a:xfrm>
+          <a:prstGeom prst="rect">
+            <a:avLst/>
+          </a:prstGeom>
+          <a:noFill/>
+        </p:spPr>
+        <p:txBody>
+          <a:bodyPr wrap="square" rtlCol="0">
+            <a:spAutoFit/>
+          </a:bodyPr>
+          <a:lstStyle/>
+          <a:p>
+            <a:r>
+              <a:rPr lang="en-US" sz="1000" dirty="0"/>
+              <a:t>[</a:t>
+            </a:r>
+            <a:r>
+              <a:rPr lang="en-US" sz="1000" dirty="0" err="1"/>
+              <a:t>Rosenbaumet</a:t>
+            </a:r>
+            <a:r>
+              <a:rPr lang="en-US" sz="1000" dirty="0"/>
+              <a:t> al.2017]</a:t>
+            </a:r>
+          </a:p>
+        </p:txBody>
+      </p:sp>
+    </p:spTree>
+    <p:extLst>
+      <p:ext uri="{BB962C8B-B14F-4D97-AF65-F5344CB8AC3E}">
+        <p14:creationId xmlns:p14="http://schemas.microsoft.com/office/powerpoint/2010/main" val="3655628678"/>
+      </p:ext>
+    </p:extLst>
+  </p:cSld>
+  <p:clrMapOvr>
+    <a:masterClrMapping/>
+  </p:clrMapOvr>
+</p:sld>
+</file>
+
+<file path=ppt/slides/slide12.xml><?xml version="1.0" encoding="utf-8"?>
+<p:sld xmlns:a="http://schemas.openxmlformats.org/drawingml/2006/main" xmlns:r="http://schemas.openxmlformats.org/officeDocument/2006/relationships" xmlns:p="http://schemas.openxmlformats.org/presentationml/2006/main">
+  <p:cSld>
+    <p:bg>
+      <p:bgPr>
+        <a:solidFill>
+          <a:schemeClr val="bg1"/>
+        </a:solidFill>
+        <a:effectLst/>
+      </p:bgPr>
+    </p:bg>
+    <p:spTree>
+      <p:nvGrpSpPr>
+        <p:cNvPr id="1" name=""/>
+        <p:cNvGrpSpPr/>
+        <p:nvPr/>
+      </p:nvGrpSpPr>
+      <p:grpSpPr>
+        <a:xfrm>
+          <a:off x="0" y="0"/>
+          <a:ext cx="0" cy="0"/>
+          <a:chOff x="0" y="0"/>
+          <a:chExt cx="0" cy="0"/>
+        </a:xfrm>
+      </p:grpSpPr>
+      <p:sp useBgFill="1">
+        <p:nvSpPr>
+          <p:cNvPr id="13" name="Rectangle 12">
+            <a:extLst>
+              <a:ext uri="{FF2B5EF4-FFF2-40B4-BE49-F238E27FC236}">
+                <a16:creationId xmlns:a16="http://schemas.microsoft.com/office/drawing/2014/main" id="{275D6C10-B5A7-4715-803E-0501C9C2CC21}"/>
+              </a:ext>
+              <a:ext uri="{C183D7F6-B498-43B3-948B-1728B52AA6E4}">
+                <adec:decorative xmlns:adec="http://schemas.microsoft.com/office/drawing/2017/decorative" val="1"/>
+              </a:ext>
+            </a:extLst>
+          </p:cNvPr>
+          <p:cNvSpPr>
+            <a:spLocks noGrp="1" noRot="1" noChangeAspect="1" noMove="1" noResize="1" noEditPoints="1" noAdjustHandles="1" noChangeArrowheads="1" noChangeShapeType="1" noTextEdit="1"/>
+          </p:cNvSpPr>
+          <p:nvPr>
+            <p:extLst>
+              <p:ext uri="{386F3935-93C4-4BCD-93E2-E3B085C9AB24}">
+                <p16:designElem xmlns:p16="http://schemas.microsoft.com/office/powerpoint/2015/main" val="1"/>
+              </p:ext>
+            </p:extLst>
+          </p:nvPr>
+        </p:nvSpPr>
+        <p:spPr>
+          <a:xfrm>
+            <a:off x="-1" y="0"/>
+            <a:ext cx="12188952" cy="6858000"/>
+          </a:xfrm>
+          <a:prstGeom prst="rect">
+            <a:avLst/>
+          </a:prstGeom>
+          <a:ln>
+            <a:noFill/>
+          </a:ln>
+        </p:spPr>
+        <p:style>
+          <a:lnRef idx="2">
+            <a:schemeClr val="accent1">
+              <a:shade val="50000"/>
+            </a:schemeClr>
+          </a:lnRef>
+          <a:fillRef idx="1">
+            <a:schemeClr val="accent1"/>
+          </a:fillRef>
+          <a:effectRef idx="0">
+            <a:schemeClr val="accent1"/>
+          </a:effectRef>
+          <a:fontRef idx="minor">
+            <a:schemeClr val="lt1"/>
+          </a:fontRef>
+        </p:style>
+        <p:txBody>
+          <a:bodyPr rtlCol="0" anchor="ctr"/>
+          <a:lstStyle/>
+          <a:p>
+            <a:pPr algn="ctr"/>
+            <a:endParaRPr lang="en-US"/>
+          </a:p>
+        </p:txBody>
+      </p:sp>
+      <p:sp>
+        <p:nvSpPr>
+          <p:cNvPr id="8" name="Titel 1">
+            <a:extLst>
+              <a:ext uri="{FF2B5EF4-FFF2-40B4-BE49-F238E27FC236}">
+                <a16:creationId xmlns:a16="http://schemas.microsoft.com/office/drawing/2014/main" id="{B54F0835-4FEF-41F7-A495-95B8EB1BF68F}"/>
+              </a:ext>
+            </a:extLst>
+          </p:cNvPr>
+          <p:cNvSpPr>
+            <a:spLocks noGrp="1"/>
+          </p:cNvSpPr>
+          <p:nvPr>
+            <p:ph type="title"/>
+          </p:nvPr>
+        </p:nvSpPr>
+        <p:spPr>
+          <a:xfrm>
+            <a:off x="648302" y="1229700"/>
+            <a:ext cx="3976496" cy="2199300"/>
+          </a:xfrm>
+        </p:spPr>
+        <p:txBody>
+          <a:bodyPr vert="horz" lIns="91440" tIns="45720" rIns="91440" bIns="45720" rtlCol="0" anchor="b">
+            <a:normAutofit/>
+          </a:bodyPr>
+          <a:lstStyle/>
+          <a:p>
+            <a:r>
+              <a:rPr lang="en-US" sz="5200" kern="1200" dirty="0">
+                <a:solidFill>
+                  <a:schemeClr val="tx1"/>
+                </a:solidFill>
+                <a:latin typeface="+mj-lt"/>
+                <a:ea typeface="+mj-ea"/>
+                <a:cs typeface="+mj-cs"/>
+              </a:rPr>
+              <a:t>Service Period</a:t>
+            </a:r>
+          </a:p>
+        </p:txBody>
+      </p:sp>
+      <p:pic>
+        <p:nvPicPr>
+          <p:cNvPr id="5" name="Grafik 4" descr="Ein Bild, das Tisch enthält.&#10;&#10;Automatisch generierte Beschreibung">
+            <a:extLst>
+              <a:ext uri="{FF2B5EF4-FFF2-40B4-BE49-F238E27FC236}">
+                <a16:creationId xmlns:a16="http://schemas.microsoft.com/office/drawing/2014/main" id="{F86E3232-7956-455B-9743-D855EFB474F5}"/>
+              </a:ext>
+            </a:extLst>
+          </p:cNvPr>
+          <p:cNvPicPr>
+            <a:picLocks noChangeAspect="1"/>
+          </p:cNvPicPr>
+          <p:nvPr/>
+        </p:nvPicPr>
+        <p:blipFill>
+          <a:blip r:embed="rId2">
+            <a:extLst>
+              <a:ext uri="{28A0092B-C50C-407E-A947-70E740481C1C}">
+                <a14:useLocalDpi xmlns:a14="http://schemas.microsoft.com/office/drawing/2010/main" val="0"/>
+              </a:ext>
+            </a:extLst>
+          </a:blip>
+          <a:stretch>
+            <a:fillRect/>
+          </a:stretch>
+        </p:blipFill>
+        <p:spPr>
+          <a:xfrm>
+            <a:off x="6384022" y="212766"/>
+            <a:ext cx="5058204" cy="6432468"/>
+          </a:xfrm>
+          <a:prstGeom prst="rect">
+            <a:avLst/>
+          </a:prstGeom>
+        </p:spPr>
+      </p:pic>
+      <p:sp>
+        <p:nvSpPr>
+          <p:cNvPr id="9" name="Textfeld 8">
+            <a:extLst>
+              <a:ext uri="{FF2B5EF4-FFF2-40B4-BE49-F238E27FC236}">
+                <a16:creationId xmlns:a16="http://schemas.microsoft.com/office/drawing/2014/main" id="{866D32DA-F96B-4064-812B-2FB15411BFC5}"/>
+              </a:ext>
+            </a:extLst>
+          </p:cNvPr>
+          <p:cNvSpPr txBox="1"/>
+          <p:nvPr/>
+        </p:nvSpPr>
+        <p:spPr>
+          <a:xfrm>
+            <a:off x="8445267" y="6595643"/>
+            <a:ext cx="3073866" cy="246221"/>
+          </a:xfrm>
+          <a:prstGeom prst="rect">
+            <a:avLst/>
+          </a:prstGeom>
+          <a:noFill/>
+        </p:spPr>
+        <p:txBody>
+          <a:bodyPr wrap="square" rtlCol="0">
+            <a:spAutoFit/>
+          </a:bodyPr>
+          <a:lstStyle/>
+          <a:p>
+            <a:r>
+              <a:rPr lang="en-US" sz="1000" dirty="0"/>
+              <a:t>[</a:t>
+            </a:r>
+            <a:r>
+              <a:rPr lang="en-US" sz="1000" dirty="0" err="1"/>
+              <a:t>Rosenbaumet</a:t>
+            </a:r>
+            <a:r>
+              <a:rPr lang="en-US" sz="1000" dirty="0"/>
+              <a:t> al.2017]</a:t>
+            </a:r>
+          </a:p>
+        </p:txBody>
+      </p:sp>
+    </p:spTree>
+    <p:extLst>
+      <p:ext uri="{BB962C8B-B14F-4D97-AF65-F5344CB8AC3E}">
+        <p14:creationId xmlns:p14="http://schemas.microsoft.com/office/powerpoint/2010/main" val="204137321"/>
+      </p:ext>
+    </p:extLst>
+  </p:cSld>
+  <p:clrMapOvr>
+    <a:masterClrMapping/>
+  </p:clrMapOvr>
+</p:sld>
+</file>
+
+<file path=ppt/slides/slide13.xml><?xml version="1.0" encoding="utf-8"?>
+<p:sld xmlns:a="http://schemas.openxmlformats.org/drawingml/2006/main" xmlns:r="http://schemas.openxmlformats.org/officeDocument/2006/relationships" xmlns:p="http://schemas.openxmlformats.org/presentationml/2006/main">
+  <p:cSld>
+    <p:bg>
+      <p:bgPr>
+        <a:solidFill>
+          <a:schemeClr val="bg1"/>
+        </a:solidFill>
+        <a:effectLst/>
+      </p:bgPr>
+    </p:bg>
+    <p:spTree>
+      <p:nvGrpSpPr>
+        <p:cNvPr id="1" name=""/>
+        <p:cNvGrpSpPr/>
+        <p:nvPr/>
+      </p:nvGrpSpPr>
+      <p:grpSpPr>
+        <a:xfrm>
+          <a:off x="0" y="0"/>
+          <a:ext cx="0" cy="0"/>
+          <a:chOff x="0" y="0"/>
+          <a:chExt cx="0" cy="0"/>
+        </a:xfrm>
+      </p:grpSpPr>
+      <p:sp useBgFill="1">
+        <p:nvSpPr>
+          <p:cNvPr id="11" name="Rectangle 10">
+            <a:extLst>
+              <a:ext uri="{FF2B5EF4-FFF2-40B4-BE49-F238E27FC236}">
+                <a16:creationId xmlns:a16="http://schemas.microsoft.com/office/drawing/2014/main" id="{22587ECF-85E9-4393-9D87-8EB6F3F6C208}"/>
+              </a:ext>
+              <a:ext uri="{C183D7F6-B498-43B3-948B-1728B52AA6E4}">
+                <adec:decorative xmlns:adec="http://schemas.microsoft.com/office/drawing/2017/decorative" val="1"/>
+              </a:ext>
+            </a:extLst>
+          </p:cNvPr>
+          <p:cNvSpPr>
+            <a:spLocks noGrp="1" noRot="1" noChangeAspect="1" noMove="1" noResize="1" noEditPoints="1" noAdjustHandles="1" noChangeArrowheads="1" noChangeShapeType="1" noTextEdit="1"/>
+          </p:cNvSpPr>
+          <p:nvPr>
+            <p:extLst>
+              <p:ext uri="{386F3935-93C4-4BCD-93E2-E3B085C9AB24}">
+                <p16:designElem xmlns:p16="http://schemas.microsoft.com/office/powerpoint/2015/main" val="1"/>
+              </p:ext>
+            </p:extLst>
+          </p:nvPr>
+        </p:nvSpPr>
+        <p:spPr>
+          <a:xfrm>
+            <a:off x="-1" y="0"/>
+            <a:ext cx="12188952" cy="6858000"/>
+          </a:xfrm>
+          <a:prstGeom prst="rect">
+            <a:avLst/>
+          </a:prstGeom>
+          <a:ln>
+            <a:noFill/>
+          </a:ln>
+        </p:spPr>
+        <p:style>
+          <a:lnRef idx="2">
+            <a:schemeClr val="accent1">
+              <a:shade val="50000"/>
+            </a:schemeClr>
+          </a:lnRef>
+          <a:fillRef idx="1">
+            <a:schemeClr val="accent1"/>
+          </a:fillRef>
+          <a:effectRef idx="0">
+            <a:schemeClr val="accent1"/>
+          </a:effectRef>
+          <a:fontRef idx="minor">
+            <a:schemeClr val="lt1"/>
+          </a:fontRef>
+        </p:style>
+        <p:txBody>
+          <a:bodyPr rtlCol="0" anchor="ctr"/>
+          <a:lstStyle/>
+          <a:p>
+            <a:pPr algn="ctr"/>
+            <a:endParaRPr lang="en-US"/>
+          </a:p>
+        </p:txBody>
+      </p:sp>
+      <p:sp>
+        <p:nvSpPr>
+          <p:cNvPr id="2" name="Titel 1">
+            <a:extLst>
+              <a:ext uri="{FF2B5EF4-FFF2-40B4-BE49-F238E27FC236}">
+                <a16:creationId xmlns:a16="http://schemas.microsoft.com/office/drawing/2014/main" id="{7A192B9F-EBFA-4972-A930-6BB6E58FFF3D}"/>
+              </a:ext>
+            </a:extLst>
+          </p:cNvPr>
+          <p:cNvSpPr>
+            <a:spLocks noGrp="1"/>
+          </p:cNvSpPr>
+          <p:nvPr>
+            <p:ph type="title"/>
+          </p:nvPr>
+        </p:nvSpPr>
+        <p:spPr>
+          <a:xfrm>
+            <a:off x="838199" y="537883"/>
+            <a:ext cx="4783697" cy="1942810"/>
+          </a:xfrm>
+        </p:spPr>
+        <p:txBody>
+          <a:bodyPr anchor="b">
+            <a:normAutofit/>
+          </a:bodyPr>
+          <a:lstStyle/>
+          <a:p>
+            <a:r>
+              <a:rPr lang="de-DE" sz="4000" dirty="0"/>
+              <a:t>Vorteile für </a:t>
+            </a:r>
+            <a:r>
+              <a:rPr lang="de-DE" sz="4000" dirty="0" err="1"/>
+              <a:t>Unternhemen</a:t>
+            </a:r>
+            <a:endParaRPr lang="de-DE" sz="4000" dirty="0"/>
+          </a:p>
+        </p:txBody>
+      </p:sp>
+      <p:sp>
+        <p:nvSpPr>
+          <p:cNvPr id="3" name="Inhaltsplatzhalter 2">
+            <a:extLst>
+              <a:ext uri="{FF2B5EF4-FFF2-40B4-BE49-F238E27FC236}">
+                <a16:creationId xmlns:a16="http://schemas.microsoft.com/office/drawing/2014/main" id="{68AF4279-EE49-4CBE-A19A-AA481D02B38D}"/>
+              </a:ext>
+            </a:extLst>
+          </p:cNvPr>
+          <p:cNvSpPr>
+            <a:spLocks noGrp="1"/>
+          </p:cNvSpPr>
+          <p:nvPr>
+            <p:ph idx="1"/>
+          </p:nvPr>
+        </p:nvSpPr>
+        <p:spPr>
+          <a:xfrm>
+            <a:off x="838199" y="2660516"/>
+            <a:ext cx="4783697" cy="3433583"/>
+          </a:xfrm>
+        </p:spPr>
+        <p:txBody>
+          <a:bodyPr>
+            <a:normAutofit/>
+          </a:bodyPr>
+          <a:lstStyle/>
+          <a:p>
+            <a:r>
+              <a:rPr lang="de-DE" sz="2000" dirty="0">
+                <a:latin typeface="Minion-Regular"/>
+              </a:rPr>
+              <a:t>Kundengetriebener Designprozess</a:t>
+            </a:r>
+          </a:p>
+          <a:p>
+            <a:r>
+              <a:rPr lang="de-DE" sz="2000" dirty="0">
+                <a:latin typeface="Minion-Regular"/>
+              </a:rPr>
+              <a:t>Sehr flexibel einsetzbar</a:t>
+            </a:r>
+          </a:p>
+          <a:p>
+            <a:r>
+              <a:rPr lang="de-DE" sz="2000" dirty="0">
+                <a:latin typeface="Minion-Regular"/>
+              </a:rPr>
+              <a:t>CJMs ermöglichen ein besseres Verständnis für die Komplexität des Produkt-Ökosystems</a:t>
+            </a:r>
+          </a:p>
+          <a:p>
+            <a:r>
+              <a:rPr lang="de-DE" sz="2000" dirty="0">
+                <a:latin typeface="Minion-Regular"/>
+              </a:rPr>
+              <a:t>Durch die Einbeziehung der Emotionen und Denkprozesse der tatsächlichen Kunden kann die Analyse über die üblichen quantitativen Daten</a:t>
+            </a:r>
+          </a:p>
+        </p:txBody>
+      </p:sp>
+      <p:pic>
+        <p:nvPicPr>
+          <p:cNvPr id="6" name="Grafik 5">
+            <a:extLst>
+              <a:ext uri="{FF2B5EF4-FFF2-40B4-BE49-F238E27FC236}">
+                <a16:creationId xmlns:a16="http://schemas.microsoft.com/office/drawing/2014/main" id="{B5E463BB-6709-4502-9835-95D112427E9A}"/>
+              </a:ext>
+            </a:extLst>
+          </p:cNvPr>
+          <p:cNvPicPr>
+            <a:picLocks noChangeAspect="1"/>
+          </p:cNvPicPr>
+          <p:nvPr/>
+        </p:nvPicPr>
+        <p:blipFill>
+          <a:blip r:embed="rId2">
+            <a:extLst>
+              <a:ext uri="{28A0092B-C50C-407E-A947-70E740481C1C}">
+                <a14:useLocalDpi xmlns:a14="http://schemas.microsoft.com/office/drawing/2010/main" val="0"/>
+              </a:ext>
+            </a:extLst>
+          </a:blip>
+          <a:stretch>
+            <a:fillRect/>
+          </a:stretch>
+        </p:blipFill>
+        <p:spPr>
+          <a:xfrm>
+            <a:off x="5988424" y="1759521"/>
+            <a:ext cx="5365375" cy="3138744"/>
+          </a:xfrm>
+          <a:prstGeom prst="rect">
+            <a:avLst/>
+          </a:prstGeom>
+        </p:spPr>
+      </p:pic>
     </p:spTree>
     <p:extLst>
       <p:ext uri="{BB962C8B-B14F-4D97-AF65-F5344CB8AC3E}">
@@ -5038,7 +6310,223 @@
 </p:sld>
 </file>
 
-<file path=ppt/slides/slide11.xml><?xml version="1.0" encoding="utf-8"?>
+<file path=ppt/slides/slide14.xml><?xml version="1.0" encoding="utf-8"?>
+<p:sld xmlns:a="http://schemas.openxmlformats.org/drawingml/2006/main" xmlns:r="http://schemas.openxmlformats.org/officeDocument/2006/relationships" xmlns:p="http://schemas.openxmlformats.org/presentationml/2006/main">
+  <p:cSld>
+    <p:bg>
+      <p:bgPr>
+        <a:solidFill>
+          <a:schemeClr val="bg1"/>
+        </a:solidFill>
+        <a:effectLst/>
+      </p:bgPr>
+    </p:bg>
+    <p:spTree>
+      <p:nvGrpSpPr>
+        <p:cNvPr id="1" name=""/>
+        <p:cNvGrpSpPr/>
+        <p:nvPr/>
+      </p:nvGrpSpPr>
+      <p:grpSpPr>
+        <a:xfrm>
+          <a:off x="0" y="0"/>
+          <a:ext cx="0" cy="0"/>
+          <a:chOff x="0" y="0"/>
+          <a:chExt cx="0" cy="0"/>
+        </a:xfrm>
+      </p:grpSpPr>
+      <p:sp useBgFill="1">
+        <p:nvSpPr>
+          <p:cNvPr id="10" name="Rectangle 9">
+            <a:extLst>
+              <a:ext uri="{FF2B5EF4-FFF2-40B4-BE49-F238E27FC236}">
+                <a16:creationId xmlns:a16="http://schemas.microsoft.com/office/drawing/2014/main" id="{22587ECF-85E9-4393-9D87-8EB6F3F6C208}"/>
+              </a:ext>
+              <a:ext uri="{C183D7F6-B498-43B3-948B-1728B52AA6E4}">
+                <adec:decorative xmlns:adec="http://schemas.microsoft.com/office/drawing/2017/decorative" val="1"/>
+              </a:ext>
+            </a:extLst>
+          </p:cNvPr>
+          <p:cNvSpPr>
+            <a:spLocks noGrp="1" noRot="1" noChangeAspect="1" noMove="1" noResize="1" noEditPoints="1" noAdjustHandles="1" noChangeArrowheads="1" noChangeShapeType="1" noTextEdit="1"/>
+          </p:cNvSpPr>
+          <p:nvPr>
+            <p:extLst>
+              <p:ext uri="{386F3935-93C4-4BCD-93E2-E3B085C9AB24}">
+                <p16:designElem xmlns:p16="http://schemas.microsoft.com/office/powerpoint/2015/main" val="1"/>
+              </p:ext>
+            </p:extLst>
+          </p:nvPr>
+        </p:nvSpPr>
+        <p:spPr>
+          <a:xfrm>
+            <a:off x="-1" y="0"/>
+            <a:ext cx="12188952" cy="6858000"/>
+          </a:xfrm>
+          <a:prstGeom prst="rect">
+            <a:avLst/>
+          </a:prstGeom>
+          <a:ln>
+            <a:noFill/>
+          </a:ln>
+        </p:spPr>
+        <p:style>
+          <a:lnRef idx="2">
+            <a:schemeClr val="accent1">
+              <a:shade val="50000"/>
+            </a:schemeClr>
+          </a:lnRef>
+          <a:fillRef idx="1">
+            <a:schemeClr val="accent1"/>
+          </a:fillRef>
+          <a:effectRef idx="0">
+            <a:schemeClr val="accent1"/>
+          </a:effectRef>
+          <a:fontRef idx="minor">
+            <a:schemeClr val="lt1"/>
+          </a:fontRef>
+        </p:style>
+        <p:txBody>
+          <a:bodyPr rtlCol="0" anchor="ctr"/>
+          <a:lstStyle/>
+          <a:p>
+            <a:pPr algn="ctr"/>
+            <a:endParaRPr lang="en-US"/>
+          </a:p>
+        </p:txBody>
+      </p:sp>
+      <p:sp>
+        <p:nvSpPr>
+          <p:cNvPr id="2" name="Titel 1">
+            <a:extLst>
+              <a:ext uri="{FF2B5EF4-FFF2-40B4-BE49-F238E27FC236}">
+                <a16:creationId xmlns:a16="http://schemas.microsoft.com/office/drawing/2014/main" id="{7604E352-3A07-4751-A9BF-C6AD3376B599}"/>
+              </a:ext>
+            </a:extLst>
+          </p:cNvPr>
+          <p:cNvSpPr>
+            <a:spLocks noGrp="1"/>
+          </p:cNvSpPr>
+          <p:nvPr>
+            <p:ph type="title"/>
+          </p:nvPr>
+        </p:nvSpPr>
+        <p:spPr>
+          <a:xfrm>
+            <a:off x="838199" y="537883"/>
+            <a:ext cx="4783697" cy="1942810"/>
+          </a:xfrm>
+        </p:spPr>
+        <p:txBody>
+          <a:bodyPr anchor="b">
+            <a:normAutofit/>
+          </a:bodyPr>
+          <a:lstStyle/>
+          <a:p>
+            <a:r>
+              <a:rPr lang="de-DE" sz="4000"/>
+              <a:t>Vorteile für Kunden</a:t>
+            </a:r>
+          </a:p>
+        </p:txBody>
+      </p:sp>
+      <p:sp>
+        <p:nvSpPr>
+          <p:cNvPr id="3" name="Inhaltsplatzhalter 2">
+            <a:extLst>
+              <a:ext uri="{FF2B5EF4-FFF2-40B4-BE49-F238E27FC236}">
+                <a16:creationId xmlns:a16="http://schemas.microsoft.com/office/drawing/2014/main" id="{002C0816-74F8-4874-87EE-C808D5CB40D1}"/>
+              </a:ext>
+            </a:extLst>
+          </p:cNvPr>
+          <p:cNvSpPr>
+            <a:spLocks noGrp="1"/>
+          </p:cNvSpPr>
+          <p:nvPr>
+            <p:ph idx="1"/>
+          </p:nvPr>
+        </p:nvSpPr>
+        <p:spPr>
+          <a:xfrm>
+            <a:off x="838199" y="2686323"/>
+            <a:ext cx="4783697" cy="3433583"/>
+          </a:xfrm>
+        </p:spPr>
+        <p:txBody>
+          <a:bodyPr>
+            <a:normAutofit/>
+          </a:bodyPr>
+          <a:lstStyle/>
+          <a:p>
+            <a:r>
+              <a:rPr lang="de-DE" sz="2000"/>
+              <a:t>Starke Einflussmöglichkeit des Kunden auf das Produkt</a:t>
+            </a:r>
+          </a:p>
+          <a:p>
+            <a:pPr marL="0" indent="0">
+              <a:buNone/>
+            </a:pPr>
+            <a:endParaRPr lang="de-DE" sz="2000"/>
+          </a:p>
+          <a:p>
+            <a:r>
+              <a:rPr lang="de-DE" sz="2000"/>
+              <a:t>Auch individuelle Ansichten oder Emotionen des Kunden im Bezug auf das Produkt werden durch die ethnographischen Methoden berücksichtigt</a:t>
+            </a:r>
+          </a:p>
+        </p:txBody>
+      </p:sp>
+      <p:pic>
+        <p:nvPicPr>
+          <p:cNvPr id="5" name="Grafik 4">
+            <a:extLst>
+              <a:ext uri="{FF2B5EF4-FFF2-40B4-BE49-F238E27FC236}">
+                <a16:creationId xmlns:a16="http://schemas.microsoft.com/office/drawing/2014/main" id="{B9B2E737-63B1-4ED5-8090-48708429B4B6}"/>
+              </a:ext>
+            </a:extLst>
+          </p:cNvPr>
+          <p:cNvPicPr>
+            <a:picLocks noChangeAspect="1"/>
+          </p:cNvPicPr>
+          <p:nvPr/>
+        </p:nvPicPr>
+        <p:blipFill>
+          <a:blip r:embed="rId2">
+            <a:extLst>
+              <a:ext uri="{28A0092B-C50C-407E-A947-70E740481C1C}">
+                <a14:useLocalDpi xmlns:a14="http://schemas.microsoft.com/office/drawing/2010/main" val="0"/>
+              </a:ext>
+            </a:extLst>
+          </a:blip>
+          <a:stretch>
+            <a:fillRect/>
+          </a:stretch>
+        </p:blipFill>
+        <p:spPr>
+          <a:xfrm>
+            <a:off x="5988424" y="1759521"/>
+            <a:ext cx="5365375" cy="3138744"/>
+          </a:xfrm>
+          <a:prstGeom prst="rect">
+            <a:avLst/>
+          </a:prstGeom>
+        </p:spPr>
+      </p:pic>
+    </p:spTree>
+    <p:extLst>
+      <p:ext uri="{BB962C8B-B14F-4D97-AF65-F5344CB8AC3E}">
+        <p14:creationId xmlns:p14="http://schemas.microsoft.com/office/powerpoint/2010/main" val="3297084981"/>
+      </p:ext>
+    </p:extLst>
+  </p:cSld>
+  <p:clrMapOvr>
+    <a:masterClrMapping/>
+  </p:clrMapOvr>
+</p:sld>
+</file>
+
+<file path=ppt/slides/slide15.xml><?xml version="1.0" encoding="utf-8"?>
 <p:sld xmlns:a="http://schemas.openxmlformats.org/drawingml/2006/main" xmlns:r="http://schemas.openxmlformats.org/officeDocument/2006/relationships" xmlns:p="http://schemas.openxmlformats.org/presentationml/2006/main">
   <p:cSld>
     <p:spTree>
@@ -5060,7 +6548,7 @@
           <p:cNvPr id="2" name="Titel 1">
             <a:extLst>
               <a:ext uri="{FF2B5EF4-FFF2-40B4-BE49-F238E27FC236}">
-                <a16:creationId xmlns:a16="http://schemas.microsoft.com/office/drawing/2014/main" id="{7604E352-3A07-4751-A9BF-C6AD3376B599}"/>
+                <a16:creationId xmlns:a16="http://schemas.microsoft.com/office/drawing/2014/main" id="{042B9283-03AE-42DC-860F-F2598CB07825}"/>
               </a:ext>
             </a:extLst>
           </p:cNvPr>
@@ -5077,9 +6565,10 @@
           <a:lstStyle/>
           <a:p>
             <a:r>
-              <a:rPr lang="de-DE" dirty="0"/>
-              <a:t>Vorteile für Kunden</a:t>
-            </a:r>
+              <a:rPr lang="en-US" dirty="0" err="1"/>
+              <a:t>Literaturquellen</a:t>
+            </a:r>
+            <a:endParaRPr lang="en-US" dirty="0"/>
           </a:p>
         </p:txBody>
       </p:sp>
@@ -5088,7 +6577,7 @@
           <p:cNvPr id="3" name="Inhaltsplatzhalter 2">
             <a:extLst>
               <a:ext uri="{FF2B5EF4-FFF2-40B4-BE49-F238E27FC236}">
-                <a16:creationId xmlns:a16="http://schemas.microsoft.com/office/drawing/2014/main" id="{002C0816-74F8-4874-87EE-C808D5CB40D1}"/>
+                <a16:creationId xmlns:a16="http://schemas.microsoft.com/office/drawing/2014/main" id="{2C9AF1AA-4E5A-4589-8C72-1BF8C40BD4E7}"/>
               </a:ext>
             </a:extLst>
           </p:cNvPr>
@@ -5101,36 +6590,709 @@
         </p:nvSpPr>
         <p:spPr/>
         <p:txBody>
-          <a:bodyPr/>
+          <a:bodyPr>
+            <a:normAutofit/>
+          </a:bodyPr>
           <a:lstStyle/>
           <a:p>
-            <a:r>
-              <a:rPr lang="de-DE" dirty="0"/>
-              <a:t>Starke Einflussmöglichkeit des Kunden auf </a:t>
-            </a:r>
-            <a:r>
-              <a:rPr lang="de-DE"/>
-              <a:t>das Produkt</a:t>
-            </a:r>
-          </a:p>
-          <a:p>
-            <a:pPr marL="0" indent="0">
+            <a:pPr marL="0" indent="0" rtl="0">
               <a:buNone/>
             </a:pPr>
-            <a:endParaRPr lang="de-DE" dirty="0"/>
-          </a:p>
-          <a:p>
-            <a:r>
-              <a:rPr lang="de-DE" dirty="0"/>
-              <a:t>Auch individuelle Ansichten oder Emotionen des Kunden im Bezug auf das Produkt werden durch die ethnographischen Methoden berücksichtigt</a:t>
-            </a:r>
+            <a:r>
+              <a:rPr lang="en-US" sz="1100" dirty="0" err="1">
+                <a:effectLst/>
+                <a:latin typeface="Arial" panose="020B0604020202020204" pitchFamily="34" charset="0"/>
+              </a:rPr>
+              <a:t>Mucz</a:t>
+            </a:r>
+            <a:r>
+              <a:rPr lang="en-US" sz="1100" dirty="0">
+                <a:effectLst/>
+                <a:latin typeface="Arial" panose="020B0604020202020204" pitchFamily="34" charset="0"/>
+              </a:rPr>
+              <a:t>, D. and </a:t>
+            </a:r>
+            <a:r>
+              <a:rPr lang="en-US" sz="1100" dirty="0" err="1">
+                <a:effectLst/>
+                <a:latin typeface="Arial" panose="020B0604020202020204" pitchFamily="34" charset="0"/>
+              </a:rPr>
+              <a:t>Gareau</a:t>
+            </a:r>
+            <a:r>
+              <a:rPr lang="en-US" sz="1100" dirty="0">
+                <a:effectLst/>
+                <a:latin typeface="Arial" panose="020B0604020202020204" pitchFamily="34" charset="0"/>
+              </a:rPr>
+              <a:t>-Brennan, </a:t>
+            </a:r>
+            <a:r>
+              <a:rPr lang="en-US" sz="1100" dirty="0" err="1">
+                <a:effectLst/>
+                <a:latin typeface="Arial" panose="020B0604020202020204" pitchFamily="34" charset="0"/>
+              </a:rPr>
+              <a:t>C.Evaluating</a:t>
+            </a:r>
+            <a:r>
+              <a:rPr lang="en-US" sz="1100" dirty="0">
+                <a:effectLst/>
+                <a:latin typeface="Arial" panose="020B0604020202020204" pitchFamily="34" charset="0"/>
+              </a:rPr>
+              <a:t> Customer Experience through Customer Journey Map-ping and Service Blueprinting at Edmonton Public Library: An Exploratory </a:t>
+            </a:r>
+            <a:r>
+              <a:rPr lang="en-US" sz="1100" dirty="0" err="1">
+                <a:effectLst/>
+                <a:latin typeface="Arial" panose="020B0604020202020204" pitchFamily="34" charset="0"/>
+              </a:rPr>
+              <a:t>Study.Partnership:The</a:t>
+            </a:r>
+            <a:r>
+              <a:rPr lang="en-US" sz="1100" dirty="0">
+                <a:effectLst/>
+                <a:latin typeface="Arial" panose="020B0604020202020204" pitchFamily="34" charset="0"/>
+              </a:rPr>
+              <a:t> Canadian Journal of Library and Information Practice and Research, 14(1), May 2019.</a:t>
+            </a:r>
+          </a:p>
+          <a:p>
+            <a:pPr marL="0" indent="0" rtl="0">
+              <a:buNone/>
+            </a:pPr>
+            <a:r>
+              <a:rPr lang="de-DE" sz="1100" b="0" i="0" dirty="0">
+                <a:solidFill>
+                  <a:srgbClr val="000000"/>
+                </a:solidFill>
+                <a:effectLst/>
+                <a:latin typeface="Arial" panose="020B0604020202020204" pitchFamily="34" charset="0"/>
+              </a:rPr>
+              <a:t>Institut der deutschen Wirtschaft Datenwirtschaft   in   Deutschland   -   Wo   stehen die  Unternehmen  in  der  Datennutzung  und  was  sind  ihre  großen  </a:t>
+            </a:r>
+            <a:r>
+              <a:rPr lang="de-DE" sz="1100" b="0" i="0" dirty="0" err="1">
+                <a:solidFill>
+                  <a:srgbClr val="000000"/>
+                </a:solidFill>
+                <a:effectLst/>
+                <a:latin typeface="Arial" panose="020B0604020202020204" pitchFamily="34" charset="0"/>
+              </a:rPr>
+              <a:t>Hemmnisse?.https</a:t>
+            </a:r>
+            <a:r>
+              <a:rPr lang="de-DE" sz="1100" b="0" i="0" dirty="0">
+                <a:solidFill>
+                  <a:srgbClr val="000000"/>
+                </a:solidFill>
+                <a:effectLst/>
+                <a:latin typeface="Arial" panose="020B0604020202020204" pitchFamily="34" charset="0"/>
+              </a:rPr>
+              <a:t>://bdi.eu/</a:t>
+            </a:r>
+            <a:r>
+              <a:rPr lang="de-DE" sz="1100" b="0" i="0" dirty="0" err="1">
+                <a:solidFill>
+                  <a:srgbClr val="000000"/>
+                </a:solidFill>
+                <a:effectLst/>
+                <a:latin typeface="Arial" panose="020B0604020202020204" pitchFamily="34" charset="0"/>
+              </a:rPr>
+              <a:t>publikation</a:t>
+            </a:r>
+            <a:r>
+              <a:rPr lang="de-DE" sz="1100" b="0" i="0" dirty="0">
+                <a:solidFill>
+                  <a:srgbClr val="000000"/>
+                </a:solidFill>
+                <a:effectLst/>
+                <a:latin typeface="Arial" panose="020B0604020202020204" pitchFamily="34" charset="0"/>
+              </a:rPr>
+              <a:t>/</a:t>
+            </a:r>
+            <a:r>
+              <a:rPr lang="de-DE" sz="1100" b="0" i="0" dirty="0" err="1">
+                <a:solidFill>
+                  <a:srgbClr val="000000"/>
+                </a:solidFill>
+                <a:effectLst/>
+                <a:latin typeface="Arial" panose="020B0604020202020204" pitchFamily="34" charset="0"/>
+              </a:rPr>
+              <a:t>news</a:t>
+            </a:r>
+            <a:r>
+              <a:rPr lang="de-DE" sz="1100" b="0" i="0" dirty="0">
+                <a:solidFill>
+                  <a:srgbClr val="000000"/>
+                </a:solidFill>
+                <a:effectLst/>
+                <a:latin typeface="Arial" panose="020B0604020202020204" pitchFamily="34" charset="0"/>
+              </a:rPr>
+              <a:t>/</a:t>
+            </a:r>
+            <a:r>
+              <a:rPr lang="de-DE" sz="1100" b="0" i="0" dirty="0" err="1">
+                <a:solidFill>
+                  <a:srgbClr val="000000"/>
+                </a:solidFill>
+                <a:effectLst/>
+                <a:latin typeface="Arial" panose="020B0604020202020204" pitchFamily="34" charset="0"/>
+              </a:rPr>
+              <a:t>datenwirtschaft</a:t>
+            </a:r>
+            <a:r>
+              <a:rPr lang="de-DE" sz="1100" b="0" i="0" dirty="0">
+                <a:solidFill>
+                  <a:srgbClr val="000000"/>
+                </a:solidFill>
+                <a:effectLst/>
+                <a:latin typeface="Arial" panose="020B0604020202020204" pitchFamily="34" charset="0"/>
+              </a:rPr>
+              <a:t>-in-deutschland/, 2021.</a:t>
+            </a:r>
+            <a:endParaRPr lang="de-DE" sz="1100" dirty="0">
+              <a:solidFill>
+                <a:srgbClr val="000000"/>
+              </a:solidFill>
+              <a:latin typeface="Arial" panose="020B0604020202020204" pitchFamily="34" charset="0"/>
+            </a:endParaRPr>
+          </a:p>
+          <a:p>
+            <a:pPr marL="0" indent="0" rtl="0">
+              <a:buNone/>
+            </a:pPr>
+            <a:r>
+              <a:rPr lang="de-DE" sz="1100" b="0" i="0" dirty="0" err="1">
+                <a:effectLst/>
+                <a:latin typeface="Arial" panose="020B0604020202020204" pitchFamily="34" charset="0"/>
+              </a:rPr>
+              <a:t>Haugstveit</a:t>
+            </a:r>
+            <a:r>
+              <a:rPr lang="de-DE" sz="1100" b="0" i="0" dirty="0">
+                <a:effectLst/>
+                <a:latin typeface="Arial" panose="020B0604020202020204" pitchFamily="34" charset="0"/>
+              </a:rPr>
+              <a:t>, I., </a:t>
+            </a:r>
+            <a:r>
+              <a:rPr lang="de-DE" sz="1100" b="0" i="0" dirty="0" err="1">
+                <a:effectLst/>
+                <a:latin typeface="Arial" panose="020B0604020202020204" pitchFamily="34" charset="0"/>
+              </a:rPr>
+              <a:t>Halvorsrud</a:t>
+            </a:r>
+            <a:r>
+              <a:rPr lang="de-DE" sz="1100" b="0" i="0" dirty="0">
+                <a:effectLst/>
+                <a:latin typeface="Arial" panose="020B0604020202020204" pitchFamily="34" charset="0"/>
+              </a:rPr>
+              <a:t>, R. and </a:t>
+            </a:r>
+            <a:r>
+              <a:rPr lang="de-DE" sz="1100" b="0" i="0" dirty="0" err="1">
+                <a:effectLst/>
+                <a:latin typeface="Arial" panose="020B0604020202020204" pitchFamily="34" charset="0"/>
+              </a:rPr>
+              <a:t>Karahasanovic</a:t>
+            </a:r>
+            <a:r>
+              <a:rPr lang="de-DE" sz="1100" b="0" i="0" dirty="0">
+                <a:effectLst/>
+                <a:latin typeface="Arial" panose="020B0604020202020204" pitchFamily="34" charset="0"/>
+              </a:rPr>
+              <a:t>, A. </a:t>
+            </a:r>
+            <a:r>
+              <a:rPr lang="de-DE" sz="1100" b="0" i="0" dirty="0" err="1">
+                <a:effectLst/>
+                <a:latin typeface="Arial" panose="020B0604020202020204" pitchFamily="34" charset="0"/>
+              </a:rPr>
+              <a:t>Supporting</a:t>
+            </a:r>
+            <a:r>
+              <a:rPr lang="de-DE" sz="1100" b="0" i="0" dirty="0">
+                <a:effectLst/>
+                <a:latin typeface="Arial" panose="020B0604020202020204" pitchFamily="34" charset="0"/>
+              </a:rPr>
+              <a:t> </a:t>
+            </a:r>
+            <a:r>
+              <a:rPr lang="de-DE" sz="1100" b="0" i="0" dirty="0" err="1">
+                <a:effectLst/>
+                <a:latin typeface="Arial" panose="020B0604020202020204" pitchFamily="34" charset="0"/>
+              </a:rPr>
+              <a:t>redesign</a:t>
+            </a:r>
+            <a:r>
+              <a:rPr lang="de-DE" sz="1100" b="0" i="0" dirty="0">
+                <a:effectLst/>
+                <a:latin typeface="Arial" panose="020B0604020202020204" pitchFamily="34" charset="0"/>
+              </a:rPr>
+              <a:t> </a:t>
+            </a:r>
+            <a:r>
+              <a:rPr lang="de-DE" sz="1100" b="0" i="0" dirty="0" err="1">
+                <a:effectLst/>
+                <a:latin typeface="Arial" panose="020B0604020202020204" pitchFamily="34" charset="0"/>
+              </a:rPr>
+              <a:t>of</a:t>
+            </a:r>
+            <a:r>
+              <a:rPr lang="de-DE" sz="1100" b="0" i="0" dirty="0">
+                <a:effectLst/>
+                <a:latin typeface="Arial" panose="020B0604020202020204" pitchFamily="34" charset="0"/>
+              </a:rPr>
+              <a:t> C2C </a:t>
+            </a:r>
+            <a:r>
+              <a:rPr lang="de-DE" sz="1100" b="0" i="0" dirty="0" err="1">
+                <a:effectLst/>
+                <a:latin typeface="Arial" panose="020B0604020202020204" pitchFamily="34" charset="0"/>
+              </a:rPr>
+              <a:t>services</a:t>
+            </a:r>
+            <a:r>
+              <a:rPr lang="de-DE" sz="1100" b="0" i="0" dirty="0">
+                <a:effectLst/>
+                <a:latin typeface="Arial" panose="020B0604020202020204" pitchFamily="34" charset="0"/>
+              </a:rPr>
+              <a:t> </a:t>
+            </a:r>
+            <a:r>
+              <a:rPr lang="de-DE" sz="1100" b="0" i="0" dirty="0" err="1">
+                <a:effectLst/>
+                <a:latin typeface="Arial" panose="020B0604020202020204" pitchFamily="34" charset="0"/>
+              </a:rPr>
+              <a:t>throughcustomer</a:t>
+            </a:r>
+            <a:r>
+              <a:rPr lang="de-DE" sz="1100" b="0" i="0" dirty="0">
+                <a:effectLst/>
+                <a:latin typeface="Arial" panose="020B0604020202020204" pitchFamily="34" charset="0"/>
+              </a:rPr>
+              <a:t> </a:t>
+            </a:r>
+            <a:r>
+              <a:rPr lang="de-DE" sz="1100" b="0" i="0" dirty="0" err="1">
+                <a:effectLst/>
+                <a:latin typeface="Arial" panose="020B0604020202020204" pitchFamily="34" charset="0"/>
+              </a:rPr>
+              <a:t>journey</a:t>
+            </a:r>
+            <a:r>
+              <a:rPr lang="de-DE" sz="1100" b="0" i="0" dirty="0">
+                <a:effectLst/>
+                <a:latin typeface="Arial" panose="020B0604020202020204" pitchFamily="34" charset="0"/>
+              </a:rPr>
+              <a:t> </a:t>
+            </a:r>
+            <a:r>
+              <a:rPr lang="de-DE" sz="1100" b="0" i="0" dirty="0" err="1">
+                <a:effectLst/>
+                <a:latin typeface="Arial" panose="020B0604020202020204" pitchFamily="34" charset="0"/>
+              </a:rPr>
+              <a:t>mapping</a:t>
+            </a:r>
+            <a:r>
+              <a:rPr lang="de-DE" sz="1100" b="0" i="0" dirty="0">
+                <a:effectLst/>
+                <a:latin typeface="Arial" panose="020B0604020202020204" pitchFamily="34" charset="0"/>
+              </a:rPr>
+              <a:t>. In N. Morelli, A. de </a:t>
+            </a:r>
+            <a:r>
+              <a:rPr lang="de-DE" sz="1100" b="0" i="0" dirty="0" err="1">
+                <a:effectLst/>
+                <a:latin typeface="Arial" panose="020B0604020202020204" pitchFamily="34" charset="0"/>
+              </a:rPr>
+              <a:t>Gotzen</a:t>
+            </a:r>
+            <a:r>
+              <a:rPr lang="de-DE" sz="1100" b="0" i="0" dirty="0">
+                <a:effectLst/>
+                <a:latin typeface="Arial" panose="020B0604020202020204" pitchFamily="34" charset="0"/>
+              </a:rPr>
+              <a:t> and F. </a:t>
+            </a:r>
+            <a:r>
+              <a:rPr lang="de-DE" sz="1100" b="0" i="0" dirty="0" err="1">
+                <a:effectLst/>
+                <a:latin typeface="Arial" panose="020B0604020202020204" pitchFamily="34" charset="0"/>
+              </a:rPr>
+              <a:t>Grani</a:t>
+            </a:r>
+            <a:r>
+              <a:rPr lang="de-DE" sz="1100" b="0" i="0" dirty="0">
+                <a:effectLst/>
+                <a:latin typeface="Arial" panose="020B0604020202020204" pitchFamily="34" charset="0"/>
+              </a:rPr>
+              <a:t>, </a:t>
+            </a:r>
+            <a:r>
+              <a:rPr lang="de-DE" sz="1100" b="0" i="0" dirty="0" err="1">
+                <a:effectLst/>
+                <a:latin typeface="Arial" panose="020B0604020202020204" pitchFamily="34" charset="0"/>
+              </a:rPr>
+              <a:t>eds</a:t>
+            </a:r>
+            <a:r>
+              <a:rPr lang="de-DE" sz="1100" b="0" i="0" dirty="0">
+                <a:effectLst/>
+                <a:latin typeface="Arial" panose="020B0604020202020204" pitchFamily="34" charset="0"/>
+              </a:rPr>
+              <a:t>.,Service Design Ge-</a:t>
+            </a:r>
+            <a:r>
+              <a:rPr lang="de-DE" sz="1100" b="0" i="0" dirty="0" err="1">
+                <a:effectLst/>
+                <a:latin typeface="Arial" panose="020B0604020202020204" pitchFamily="34" charset="0"/>
+              </a:rPr>
+              <a:t>ographies</a:t>
+            </a:r>
+            <a:r>
+              <a:rPr lang="de-DE" sz="1100" b="0" i="0" dirty="0">
+                <a:effectLst/>
+                <a:latin typeface="Arial" panose="020B0604020202020204" pitchFamily="34" charset="0"/>
+              </a:rPr>
+              <a:t>. Proceedings </a:t>
+            </a:r>
+            <a:r>
+              <a:rPr lang="de-DE" sz="1100" b="0" i="0" dirty="0" err="1">
+                <a:effectLst/>
+                <a:latin typeface="Arial" panose="020B0604020202020204" pitchFamily="34" charset="0"/>
+              </a:rPr>
+              <a:t>of</a:t>
+            </a:r>
+            <a:r>
+              <a:rPr lang="de-DE" sz="1100" b="0" i="0" dirty="0">
+                <a:effectLst/>
+                <a:latin typeface="Arial" panose="020B0604020202020204" pitchFamily="34" charset="0"/>
+              </a:rPr>
+              <a:t> </a:t>
+            </a:r>
+            <a:r>
+              <a:rPr lang="de-DE" sz="1100" b="0" i="0" dirty="0" err="1">
+                <a:effectLst/>
+                <a:latin typeface="Arial" panose="020B0604020202020204" pitchFamily="34" charset="0"/>
+              </a:rPr>
+              <a:t>the</a:t>
+            </a:r>
+            <a:r>
+              <a:rPr lang="de-DE" sz="1100" b="0" i="0" dirty="0">
+                <a:effectLst/>
+                <a:latin typeface="Arial" panose="020B0604020202020204" pitchFamily="34" charset="0"/>
+              </a:rPr>
+              <a:t> ServDes2016 Conference, </a:t>
+            </a:r>
+            <a:r>
+              <a:rPr lang="de-DE" sz="1100" b="0" i="0" dirty="0" err="1">
+                <a:effectLst/>
+                <a:latin typeface="Arial" panose="020B0604020202020204" pitchFamily="34" charset="0"/>
+              </a:rPr>
+              <a:t>Linkoping</a:t>
+            </a:r>
+            <a:r>
+              <a:rPr lang="de-DE" sz="1100" b="0" i="0" dirty="0">
+                <a:effectLst/>
+                <a:latin typeface="Arial" panose="020B0604020202020204" pitchFamily="34" charset="0"/>
+              </a:rPr>
+              <a:t> Electronic Conference Pro-</a:t>
+            </a:r>
+            <a:r>
+              <a:rPr lang="de-DE" sz="1100" b="0" i="0" dirty="0" err="1">
+                <a:effectLst/>
+                <a:latin typeface="Arial" panose="020B0604020202020204" pitchFamily="34" charset="0"/>
+              </a:rPr>
+              <a:t>ceedings</a:t>
+            </a:r>
+            <a:r>
+              <a:rPr lang="de-DE" sz="1100" b="0" i="0" dirty="0">
+                <a:effectLst/>
+                <a:latin typeface="Arial" panose="020B0604020202020204" pitchFamily="34" charset="0"/>
+              </a:rPr>
+              <a:t>, </a:t>
+            </a:r>
+            <a:r>
+              <a:rPr lang="de-DE" sz="1100" b="0" i="0" dirty="0" err="1">
+                <a:effectLst/>
+                <a:latin typeface="Arial" panose="020B0604020202020204" pitchFamily="34" charset="0"/>
+              </a:rPr>
+              <a:t>Linkoping</a:t>
+            </a:r>
+            <a:r>
+              <a:rPr lang="de-DE" sz="1100" b="0" i="0" dirty="0">
+                <a:effectLst/>
+                <a:latin typeface="Arial" panose="020B0604020202020204" pitchFamily="34" charset="0"/>
+              </a:rPr>
+              <a:t> University Electronic Press, 05 2016, pp. 215 – 227.</a:t>
+            </a:r>
+          </a:p>
+          <a:p>
+            <a:pPr marL="0" indent="0" rtl="0">
+              <a:buNone/>
+            </a:pPr>
+            <a:r>
+              <a:rPr lang="de-DE" sz="1100" b="0" i="0" dirty="0">
+                <a:solidFill>
+                  <a:srgbClr val="000000"/>
+                </a:solidFill>
+                <a:effectLst/>
+                <a:latin typeface="Arial" panose="020B0604020202020204" pitchFamily="34" charset="0"/>
+              </a:rPr>
+              <a:t>Institut der deutschen Wirtschaft: Datenwirtschaft in Deutschland - Wo stehen die Unternehmen in der Datennutzung und was sind ihre größten Hemmnisse? 2021</a:t>
+            </a:r>
+          </a:p>
+          <a:p>
+            <a:pPr marL="0" indent="0" rtl="0">
+              <a:buNone/>
+            </a:pPr>
+            <a:r>
+              <a:rPr lang="en-US" sz="1100" b="0" i="0" dirty="0">
+                <a:solidFill>
+                  <a:srgbClr val="000000"/>
+                </a:solidFill>
+                <a:effectLst/>
+                <a:latin typeface="Arial" panose="020B0604020202020204" pitchFamily="34" charset="0"/>
+              </a:rPr>
+              <a:t>Rosenbaum, M. S., </a:t>
+            </a:r>
+            <a:r>
+              <a:rPr lang="en-US" sz="1100" b="0" i="0" dirty="0" err="1">
+                <a:solidFill>
+                  <a:srgbClr val="000000"/>
+                </a:solidFill>
+                <a:effectLst/>
+                <a:latin typeface="Arial" panose="020B0604020202020204" pitchFamily="34" charset="0"/>
+              </a:rPr>
+              <a:t>Otalora</a:t>
+            </a:r>
+            <a:r>
+              <a:rPr lang="en-US" sz="1100" b="0" i="0" dirty="0">
+                <a:solidFill>
+                  <a:srgbClr val="000000"/>
+                </a:solidFill>
+                <a:effectLst/>
+                <a:latin typeface="Arial" panose="020B0604020202020204" pitchFamily="34" charset="0"/>
+              </a:rPr>
+              <a:t>, M. L. and Ramirez, G. </a:t>
+            </a:r>
+            <a:r>
+              <a:rPr lang="en-US" sz="1100" b="0" i="0" dirty="0" err="1">
+                <a:solidFill>
+                  <a:srgbClr val="000000"/>
+                </a:solidFill>
+                <a:effectLst/>
+                <a:latin typeface="Arial" panose="020B0604020202020204" pitchFamily="34" charset="0"/>
+              </a:rPr>
+              <a:t>C.How</a:t>
+            </a:r>
+            <a:r>
+              <a:rPr lang="en-US" sz="1100" b="0" i="0" dirty="0">
+                <a:solidFill>
+                  <a:srgbClr val="000000"/>
+                </a:solidFill>
+                <a:effectLst/>
+                <a:latin typeface="Arial" panose="020B0604020202020204" pitchFamily="34" charset="0"/>
+              </a:rPr>
+              <a:t> to create a realistic customer </a:t>
+            </a:r>
+            <a:r>
+              <a:rPr lang="en-US" sz="1100" b="0" i="0" dirty="0" err="1">
+                <a:solidFill>
+                  <a:srgbClr val="000000"/>
+                </a:solidFill>
+                <a:effectLst/>
+                <a:latin typeface="Arial" panose="020B0604020202020204" pitchFamily="34" charset="0"/>
+              </a:rPr>
+              <a:t>journeymap.Business</a:t>
+            </a:r>
+            <a:r>
+              <a:rPr lang="en-US" sz="1100" b="0" i="0" dirty="0">
+                <a:solidFill>
+                  <a:srgbClr val="000000"/>
+                </a:solidFill>
+                <a:effectLst/>
+                <a:latin typeface="Arial" panose="020B0604020202020204" pitchFamily="34" charset="0"/>
+              </a:rPr>
+              <a:t> Horizons, 60(1), 2017: pp.  143–150.— 4 —</a:t>
+            </a:r>
+          </a:p>
+          <a:p>
+            <a:pPr marL="0" indent="0" rtl="0">
+              <a:buNone/>
+            </a:pPr>
+            <a:endParaRPr lang="de-DE" sz="1100" b="0" i="0" dirty="0">
+              <a:solidFill>
+                <a:srgbClr val="000000"/>
+              </a:solidFill>
+              <a:effectLst/>
+              <a:latin typeface="Arial" panose="020B0604020202020204" pitchFamily="34" charset="0"/>
+            </a:endParaRPr>
+          </a:p>
+          <a:p>
+            <a:pPr marL="0" indent="0" rtl="0">
+              <a:buNone/>
+            </a:pPr>
+            <a:br>
+              <a:rPr lang="en-US" sz="1100" b="0" i="0" dirty="0">
+                <a:solidFill>
+                  <a:srgbClr val="000000"/>
+                </a:solidFill>
+                <a:effectLst/>
+                <a:latin typeface="Arial" panose="020B0604020202020204" pitchFamily="34" charset="0"/>
+              </a:rPr>
+            </a:br>
+            <a:endParaRPr lang="en-US" sz="1100" dirty="0"/>
           </a:p>
         </p:txBody>
       </p:sp>
     </p:spTree>
     <p:extLst>
       <p:ext uri="{BB962C8B-B14F-4D97-AF65-F5344CB8AC3E}">
-        <p14:creationId xmlns:p14="http://schemas.microsoft.com/office/powerpoint/2010/main" val="3297084981"/>
+        <p14:creationId xmlns:p14="http://schemas.microsoft.com/office/powerpoint/2010/main" val="1748375574"/>
+      </p:ext>
+    </p:extLst>
+  </p:cSld>
+  <p:clrMapOvr>
+    <a:masterClrMapping/>
+  </p:clrMapOvr>
+</p:sld>
+</file>
+
+<file path=ppt/slides/slide16.xml><?xml version="1.0" encoding="utf-8"?>
+<p:sld xmlns:a="http://schemas.openxmlformats.org/drawingml/2006/main" xmlns:r="http://schemas.openxmlformats.org/officeDocument/2006/relationships" xmlns:p="http://schemas.openxmlformats.org/presentationml/2006/main">
+  <p:cSld>
+    <p:spTree>
+      <p:nvGrpSpPr>
+        <p:cNvPr id="1" name=""/>
+        <p:cNvGrpSpPr/>
+        <p:nvPr/>
+      </p:nvGrpSpPr>
+      <p:grpSpPr>
+        <a:xfrm>
+          <a:off x="0" y="0"/>
+          <a:ext cx="0" cy="0"/>
+          <a:chOff x="0" y="0"/>
+          <a:chExt cx="0" cy="0"/>
+        </a:xfrm>
+      </p:grpSpPr>
+      <p:sp>
+        <p:nvSpPr>
+          <p:cNvPr id="2" name="Titel 1">
+            <a:extLst>
+              <a:ext uri="{FF2B5EF4-FFF2-40B4-BE49-F238E27FC236}">
+                <a16:creationId xmlns:a16="http://schemas.microsoft.com/office/drawing/2014/main" id="{EB32BDE4-8705-4DE5-B76B-E01435DCDC1C}"/>
+              </a:ext>
+            </a:extLst>
+          </p:cNvPr>
+          <p:cNvSpPr>
+            <a:spLocks noGrp="1"/>
+          </p:cNvSpPr>
+          <p:nvPr>
+            <p:ph type="title"/>
+          </p:nvPr>
+        </p:nvSpPr>
+        <p:spPr/>
+        <p:txBody>
+          <a:bodyPr/>
+          <a:lstStyle/>
+          <a:p>
+            <a:r>
+              <a:rPr lang="en-US" dirty="0" err="1"/>
+              <a:t>Bilderquellen</a:t>
+            </a:r>
+            <a:endParaRPr lang="en-US" dirty="0"/>
+          </a:p>
+        </p:txBody>
+      </p:sp>
+      <p:sp>
+        <p:nvSpPr>
+          <p:cNvPr id="4" name="Textfeld 3">
+            <a:extLst>
+              <a:ext uri="{FF2B5EF4-FFF2-40B4-BE49-F238E27FC236}">
+                <a16:creationId xmlns:a16="http://schemas.microsoft.com/office/drawing/2014/main" id="{D3913042-6E3C-4BAE-9222-9464FF4BF8ED}"/>
+              </a:ext>
+            </a:extLst>
+          </p:cNvPr>
+          <p:cNvSpPr txBox="1"/>
+          <p:nvPr/>
+        </p:nvSpPr>
+        <p:spPr>
+          <a:xfrm>
+            <a:off x="520116" y="1862356"/>
+            <a:ext cx="10956023" cy="1477328"/>
+          </a:xfrm>
+          <a:prstGeom prst="rect">
+            <a:avLst/>
+          </a:prstGeom>
+          <a:noFill/>
+        </p:spPr>
+        <p:txBody>
+          <a:bodyPr wrap="square" rtlCol="0">
+            <a:spAutoFit/>
+          </a:bodyPr>
+          <a:lstStyle/>
+          <a:p>
+            <a:r>
+              <a:rPr lang="en-US" dirty="0"/>
+              <a:t>Bild Folie 1:</a:t>
+            </a:r>
+            <a:r>
+              <a:rPr lang="de-DE" dirty="0"/>
+              <a:t> </a:t>
+            </a:r>
+            <a:r>
+              <a:rPr lang="de-DE" dirty="0">
+                <a:hlinkClick r:id="rId2"/>
+              </a:rPr>
+              <a:t>https://www.digitalradar-muensterland.de/eine-customer-journey-map-erstellen/</a:t>
+            </a:r>
+            <a:r>
+              <a:rPr lang="de-DE" dirty="0"/>
+              <a:t>, Zugriff: 04.06.21</a:t>
+            </a:r>
+          </a:p>
+          <a:p>
+            <a:r>
+              <a:rPr lang="de-DE" dirty="0"/>
+              <a:t>Bild Folie 3: </a:t>
+            </a:r>
+            <a:r>
+              <a:rPr lang="de-DE" dirty="0">
+                <a:hlinkClick r:id="rId3"/>
+              </a:rPr>
+              <a:t>https://miro.com/guides/customer-journey-mapping/</a:t>
+            </a:r>
+            <a:endParaRPr lang="de-DE" dirty="0"/>
+          </a:p>
+          <a:p>
+            <a:r>
+              <a:rPr lang="de-DE" dirty="0"/>
+              <a:t>Bild Folie 4: </a:t>
+            </a:r>
+            <a:r>
+              <a:rPr lang="de-DE" dirty="0">
+                <a:hlinkClick r:id="rId4"/>
+              </a:rPr>
+              <a:t>http://blog.clickdimensions.com/how-to-create-a-customer-journey-map-and-why-you-need-one/</a:t>
+            </a:r>
+            <a:endParaRPr lang="de-DE" dirty="0"/>
+          </a:p>
+          <a:p>
+            <a:r>
+              <a:rPr lang="de-DE" dirty="0"/>
+              <a:t>Bild Folie 5: https://uxstudioteam.com/ux-blog/ethnographic-research/</a:t>
+            </a:r>
+          </a:p>
+          <a:p>
+            <a:endParaRPr lang="en-US" dirty="0"/>
+          </a:p>
+        </p:txBody>
+      </p:sp>
+    </p:spTree>
+    <p:extLst>
+      <p:ext uri="{BB962C8B-B14F-4D97-AF65-F5344CB8AC3E}">
+        <p14:creationId xmlns:p14="http://schemas.microsoft.com/office/powerpoint/2010/main" val="3298032880"/>
       </p:ext>
     </p:extLst>
   </p:cSld>
@@ -5320,22 +7482,10 @@
             <a:r>
               <a:rPr lang="de-DE" sz="900" b="0" i="0" dirty="0">
                 <a:effectLst/>
+                <a:latin typeface="Arial" panose="020B0604020202020204" pitchFamily="34" charset="0"/>
               </a:rPr>
-              <a:t>Aus: Institut der deutschen Wirtschaft: Datenwirtschaft in Deutschland - Wo stehen die Unternehmen in der Datennutzung und was sind ihre größten Hemmnisse? 2021</a:t>
-            </a:r>
-            <a:endParaRPr lang="de-DE" sz="900" dirty="0"/>
-          </a:p>
-          <a:p>
-            <a:pPr indent="-228600">
-              <a:lnSpc>
-                <a:spcPct val="90000"/>
-              </a:lnSpc>
-              <a:spcAft>
-                <a:spcPts val="600"/>
-              </a:spcAft>
-              <a:buFont typeface="Arial" panose="020B0604020202020204" pitchFamily="34" charset="0"/>
-              <a:buChar char="•"/>
-            </a:pPr>
+              <a:t>[Institut der deutschen Wirtschaft 2021] </a:t>
+            </a:r>
             <a:endParaRPr lang="en-US" sz="2000" dirty="0"/>
           </a:p>
         </p:txBody>
@@ -5679,41 +7829,6 @@
           </a:prstGeom>
         </p:spPr>
       </p:pic>
-      <p:sp>
-        <p:nvSpPr>
-          <p:cNvPr id="6" name="Textfeld 5">
-            <a:extLst>
-              <a:ext uri="{FF2B5EF4-FFF2-40B4-BE49-F238E27FC236}">
-                <a16:creationId xmlns:a16="http://schemas.microsoft.com/office/drawing/2014/main" id="{60506E7C-0D8A-4387-88CB-5F161EBC6FAF}"/>
-              </a:ext>
-            </a:extLst>
-          </p:cNvPr>
-          <p:cNvSpPr txBox="1"/>
-          <p:nvPr/>
-        </p:nvSpPr>
-        <p:spPr>
-          <a:xfrm>
-            <a:off x="6096000" y="4907560"/>
-            <a:ext cx="5354972" cy="646331"/>
-          </a:xfrm>
-          <a:prstGeom prst="rect">
-            <a:avLst/>
-          </a:prstGeom>
-          <a:noFill/>
-        </p:spPr>
-        <p:txBody>
-          <a:bodyPr wrap="square" rtlCol="0">
-            <a:spAutoFit/>
-          </a:bodyPr>
-          <a:lstStyle/>
-          <a:p>
-            <a:r>
-              <a:rPr lang="de-DE" dirty="0"/>
-              <a:t>Bild: https://miro.com/guides/customer-journey-mapping/</a:t>
-            </a:r>
-          </a:p>
-        </p:txBody>
-      </p:sp>
     </p:spTree>
     <p:extLst>
       <p:ext uri="{BB962C8B-B14F-4D97-AF65-F5344CB8AC3E}">
@@ -5930,41 +8045,6 @@
           </a:prstGeom>
         </p:spPr>
       </p:pic>
-      <p:sp>
-        <p:nvSpPr>
-          <p:cNvPr id="6" name="Textfeld 5">
-            <a:extLst>
-              <a:ext uri="{FF2B5EF4-FFF2-40B4-BE49-F238E27FC236}">
-                <a16:creationId xmlns:a16="http://schemas.microsoft.com/office/drawing/2014/main" id="{10997452-4696-4E3D-B00A-8488F51132DE}"/>
-              </a:ext>
-            </a:extLst>
-          </p:cNvPr>
-          <p:cNvSpPr txBox="1"/>
-          <p:nvPr/>
-        </p:nvSpPr>
-        <p:spPr>
-          <a:xfrm>
-            <a:off x="5176007" y="5444455"/>
-            <a:ext cx="6291743" cy="646331"/>
-          </a:xfrm>
-          <a:prstGeom prst="rect">
-            <a:avLst/>
-          </a:prstGeom>
-          <a:noFill/>
-        </p:spPr>
-        <p:txBody>
-          <a:bodyPr wrap="square" rtlCol="0">
-            <a:spAutoFit/>
-          </a:bodyPr>
-          <a:lstStyle/>
-          <a:p>
-            <a:r>
-              <a:rPr lang="de-DE" dirty="0"/>
-              <a:t>Bild: http://blog.clickdimensions.com/how-to-create-a-customer-journey-map-and-why-you-need-one/</a:t>
-            </a:r>
-          </a:p>
-        </p:txBody>
-      </p:sp>
     </p:spTree>
     <p:extLst>
       <p:ext uri="{BB962C8B-B14F-4D97-AF65-F5344CB8AC3E}">
@@ -6000,7 +8080,7 @@
           <p:cNvPr id="2" name="Titel 1">
             <a:extLst>
               <a:ext uri="{FF2B5EF4-FFF2-40B4-BE49-F238E27FC236}">
-                <a16:creationId xmlns:a16="http://schemas.microsoft.com/office/drawing/2014/main" id="{65D31581-0A1D-44E2-8969-5266A43E44E7}"/>
+                <a16:creationId xmlns:a16="http://schemas.microsoft.com/office/drawing/2014/main" id="{6879D8D2-07EF-416C-A247-81F1C89A4FAF}"/>
               </a:ext>
             </a:extLst>
           </p:cNvPr>
@@ -6016,88 +8096,30 @@
           <a:bodyPr/>
           <a:lstStyle/>
           <a:p>
+            <a:pPr algn="ctr"/>
             <a:r>
               <a:rPr lang="de-DE" dirty="0"/>
-              <a:t>Bestandteile einer Customer Journey </a:t>
-            </a:r>
-            <a:r>
-              <a:rPr lang="de-DE" dirty="0" err="1"/>
-              <a:t>Map</a:t>
-            </a:r>
-            <a:br>
-              <a:rPr lang="de-DE" dirty="0"/>
-            </a:br>
-            <a:r>
-              <a:rPr lang="de-DE" dirty="0"/>
-              <a:t>(NICHT IN PRÄSENTATION)</a:t>
-            </a:r>
-          </a:p>
-        </p:txBody>
-      </p:sp>
-      <p:sp>
-        <p:nvSpPr>
-          <p:cNvPr id="3" name="Inhaltsplatzhalter 2">
-            <a:extLst>
-              <a:ext uri="{FF2B5EF4-FFF2-40B4-BE49-F238E27FC236}">
-                <a16:creationId xmlns:a16="http://schemas.microsoft.com/office/drawing/2014/main" id="{E9DFB572-5726-494D-B4E9-C08E778FF1D7}"/>
-              </a:ext>
-            </a:extLst>
-          </p:cNvPr>
-          <p:cNvSpPr>
-            <a:spLocks noGrp="1"/>
-          </p:cNvSpPr>
-          <p:nvPr>
-            <p:ph idx="1"/>
-          </p:nvPr>
+              <a:t>Bestandteile einer CJM</a:t>
+            </a:r>
+          </a:p>
+        </p:txBody>
+      </p:sp>
+      <p:sp>
+        <p:nvSpPr>
+          <p:cNvPr id="4" name="Textfeld 3">
+            <a:extLst>
+              <a:ext uri="{FF2B5EF4-FFF2-40B4-BE49-F238E27FC236}">
+                <a16:creationId xmlns:a16="http://schemas.microsoft.com/office/drawing/2014/main" id="{F2778520-16A5-442E-8B6F-13AB50F62432}"/>
+              </a:ext>
+            </a:extLst>
+          </p:cNvPr>
+          <p:cNvSpPr txBox="1"/>
+          <p:nvPr/>
         </p:nvSpPr>
         <p:spPr>
           <a:xfrm>
-            <a:off x="276138" y="1979802"/>
-            <a:ext cx="3649910" cy="2206305"/>
-          </a:xfrm>
-        </p:spPr>
-        <p:txBody>
-          <a:bodyPr>
-            <a:normAutofit/>
-          </a:bodyPr>
-          <a:lstStyle/>
-          <a:p>
-            <a:pPr marL="0" indent="0">
-              <a:buNone/>
-            </a:pPr>
-            <a:r>
-              <a:rPr lang="en-US" sz="1800" dirty="0"/>
-              <a:t>Customer:</a:t>
-            </a:r>
-          </a:p>
-          <a:p>
-            <a:pPr marL="0" indent="0">
-              <a:buNone/>
-            </a:pPr>
-            <a:r>
-              <a:rPr lang="en-US" sz="1800" dirty="0"/>
-              <a:t>A customer is the stakeholder experiencing a service. The importance of collecting sociodemographic information to ease CJMs users to put themselves in customers’ shoes].</a:t>
-            </a:r>
-            <a:endParaRPr lang="de-DE" sz="1800" dirty="0"/>
-          </a:p>
-        </p:txBody>
-      </p:sp>
-      <p:sp>
-        <p:nvSpPr>
-          <p:cNvPr id="4" name="Textfeld 3">
-            <a:extLst>
-              <a:ext uri="{FF2B5EF4-FFF2-40B4-BE49-F238E27FC236}">
-                <a16:creationId xmlns:a16="http://schemas.microsoft.com/office/drawing/2014/main" id="{15761435-7B46-4F4C-99B7-50E2A2382EF1}"/>
-              </a:ext>
-            </a:extLst>
-          </p:cNvPr>
-          <p:cNvSpPr txBox="1"/>
-          <p:nvPr/>
-        </p:nvSpPr>
-        <p:spPr>
-          <a:xfrm>
-            <a:off x="3984771" y="1912690"/>
-            <a:ext cx="4395831" cy="3970318"/>
+            <a:off x="218900" y="6488668"/>
+            <a:ext cx="10382250" cy="523220"/>
           </a:xfrm>
           <a:prstGeom prst="rect">
             <a:avLst/>
@@ -6110,339 +8132,30 @@
           </a:bodyPr>
           <a:lstStyle/>
           <a:p>
-            <a:pPr algn="l"/>
-            <a:r>
-              <a:rPr lang="en-US" b="0" i="0" u="none" strike="noStrike" baseline="0" dirty="0"/>
-              <a:t>Journey:</a:t>
-            </a:r>
-          </a:p>
-          <a:p>
-            <a:pPr algn="l"/>
-            <a:r>
-              <a:rPr lang="en-US" b="0" i="0" u="none" strike="noStrike" baseline="0" dirty="0"/>
-              <a:t>A CJM contains at least one journey, which is a typical path followed</a:t>
-            </a:r>
-          </a:p>
-          <a:p>
-            <a:pPr algn="l"/>
-            <a:r>
-              <a:rPr lang="en-US" b="0" i="0" u="none" strike="noStrike" baseline="0" dirty="0"/>
-              <a:t>by a customer. Two types of CJMs exist. One is designed by internal</a:t>
-            </a:r>
-          </a:p>
-          <a:p>
-            <a:pPr algn="l"/>
-            <a:r>
-              <a:rPr lang="en-US" b="0" i="0" u="none" strike="noStrike" baseline="0" dirty="0"/>
-              <a:t>stakeholders to describe what an ideal journey would look like, which identifies</a:t>
-            </a:r>
-          </a:p>
-          <a:p>
-            <a:pPr algn="l"/>
-            <a:r>
-              <a:rPr lang="en-US" b="0" i="0" u="none" strike="noStrike" baseline="0" dirty="0"/>
-              <a:t>opportunities for novel services or is employed as a diagnostic tool.</a:t>
-            </a:r>
-          </a:p>
-          <a:p>
-            <a:pPr algn="l"/>
-            <a:r>
-              <a:rPr lang="en-US" b="0" i="0" u="none" strike="noStrike" baseline="0" dirty="0"/>
-              <a:t>We refer to the latter as the expected journey. In contrast, the actual journey</a:t>
-            </a:r>
-          </a:p>
-          <a:p>
-            <a:pPr algn="l"/>
-            <a:r>
-              <a:rPr lang="en-US" b="0" i="0" u="none" strike="noStrike" baseline="0" dirty="0"/>
-              <a:t>showcases how a journey is experienced by the customer, finds existing customers’</a:t>
-            </a:r>
-          </a:p>
-          <a:p>
-            <a:pPr algn="l"/>
-            <a:r>
-              <a:rPr lang="en-US" b="0" i="0" u="none" strike="noStrike" baseline="0" dirty="0"/>
-              <a:t>problems or needs.</a:t>
-            </a:r>
-            <a:endParaRPr lang="de-DE" dirty="0"/>
-          </a:p>
-        </p:txBody>
-      </p:sp>
-      <p:sp>
-        <p:nvSpPr>
-          <p:cNvPr id="5" name="Textfeld 4">
-            <a:extLst>
-              <a:ext uri="{FF2B5EF4-FFF2-40B4-BE49-F238E27FC236}">
-                <a16:creationId xmlns:a16="http://schemas.microsoft.com/office/drawing/2014/main" id="{FBEC26AE-4D9A-4F25-918F-869194E24866}"/>
-              </a:ext>
-            </a:extLst>
-          </p:cNvPr>
-          <p:cNvSpPr txBox="1"/>
-          <p:nvPr/>
-        </p:nvSpPr>
-        <p:spPr>
-          <a:xfrm>
-            <a:off x="276137" y="4269995"/>
-            <a:ext cx="3649911" cy="2308324"/>
-          </a:xfrm>
-          <a:prstGeom prst="rect">
-            <a:avLst/>
-          </a:prstGeom>
-          <a:noFill/>
-        </p:spPr>
-        <p:txBody>
-          <a:bodyPr wrap="square" rtlCol="0">
-            <a:spAutoFit/>
-          </a:bodyPr>
-          <a:lstStyle/>
-          <a:p>
-            <a:r>
-              <a:rPr lang="en-US" dirty="0"/>
-              <a:t>Goal:</a:t>
-            </a:r>
-          </a:p>
-          <a:p>
-            <a:r>
-              <a:rPr lang="en-US" dirty="0"/>
-              <a:t>A customer journey should be mapped with a goal in mind,</a:t>
-            </a:r>
-          </a:p>
-          <a:p>
-            <a:r>
-              <a:rPr lang="en-US" dirty="0"/>
-              <a:t>which is also referred to as scenario, prompts, story, or main intention. It triggers interactions with users, and streamlines the thought process</a:t>
-            </a:r>
-          </a:p>
-          <a:p>
-            <a:r>
-              <a:rPr lang="en-US" dirty="0"/>
-              <a:t>for users. </a:t>
-            </a:r>
-            <a:endParaRPr lang="de-DE" dirty="0"/>
-          </a:p>
-        </p:txBody>
-      </p:sp>
-      <p:sp>
-        <p:nvSpPr>
-          <p:cNvPr id="8" name="Textfeld 7">
-            <a:extLst>
-              <a:ext uri="{FF2B5EF4-FFF2-40B4-BE49-F238E27FC236}">
-                <a16:creationId xmlns:a16="http://schemas.microsoft.com/office/drawing/2014/main" id="{2ECB29DF-0B3F-4F62-B68A-609B5828D661}"/>
-              </a:ext>
-            </a:extLst>
-          </p:cNvPr>
-          <p:cNvSpPr txBox="1"/>
-          <p:nvPr/>
-        </p:nvSpPr>
-        <p:spPr>
-          <a:xfrm>
-            <a:off x="8867162" y="1722783"/>
-            <a:ext cx="3162649" cy="4801314"/>
-          </a:xfrm>
-          <a:prstGeom prst="rect">
-            <a:avLst/>
-          </a:prstGeom>
-          <a:noFill/>
-        </p:spPr>
-        <p:txBody>
-          <a:bodyPr wrap="square" rtlCol="0">
-            <a:spAutoFit/>
-          </a:bodyPr>
-          <a:lstStyle/>
-          <a:p>
-            <a:pPr algn="l"/>
-            <a:r>
-              <a:rPr lang="en-US" sz="1800" b="0" i="0" u="none" strike="noStrike" baseline="0" dirty="0">
-                <a:latin typeface="SFBX1000"/>
+            <a:r>
+              <a:rPr lang="de-DE" sz="1000" b="0" i="0" dirty="0">
+                <a:effectLst/>
+                <a:latin typeface="Arial" panose="020B0604020202020204" pitchFamily="34" charset="0"/>
               </a:rPr>
-              <a:t>Touchpoint. </a:t>
-            </a:r>
-            <a:r>
-              <a:rPr lang="en-US" sz="1800" b="0" i="0" u="none" strike="noStrike" baseline="0" dirty="0">
-                <a:latin typeface="SFRM1000"/>
+              <a:t>[</a:t>
+            </a:r>
+            <a:r>
+              <a:rPr lang="de-DE" sz="1000" b="0" i="0" dirty="0" err="1">
+                <a:effectLst/>
+                <a:latin typeface="Arial" panose="020B0604020202020204" pitchFamily="34" charset="0"/>
               </a:rPr>
-              <a:t>A </a:t>
-            </a:r>
-            <a:r>
-              <a:rPr lang="en-US" sz="1800" b="0" i="0" u="none" strike="noStrike" baseline="0" dirty="0">
-                <a:latin typeface="SFTI1000"/>
+              <a:t>Haugstveitet</a:t>
+            </a:r>
+            <a:r>
+              <a:rPr lang="de-DE" sz="1000" b="0" i="0" dirty="0">
+                <a:effectLst/>
+                <a:latin typeface="Arial" panose="020B0604020202020204" pitchFamily="34" charset="0"/>
               </a:rPr>
-              <a:t>touchpoint </a:t>
-            </a:r>
-            <a:r>
-              <a:rPr lang="en-US" sz="1800" b="0" i="0" u="none" strike="noStrike" baseline="0" dirty="0">
-                <a:latin typeface="SFRM1000"/>
-              </a:rPr>
-              <a:t>is an interaction between customers and companies’</a:t>
-            </a:r>
-          </a:p>
-          <a:p>
-            <a:pPr algn="l"/>
-            <a:r>
-              <a:rPr lang="en-US" sz="1800" b="0" i="0" u="none" strike="noStrike" baseline="0" dirty="0">
-                <a:latin typeface="SFRM1000"/>
-              </a:rPr>
-              <a:t>products or services. The arrangement of touchpoints can be </a:t>
-            </a:r>
-            <a:r>
-              <a:rPr lang="en-US" sz="1800" b="0" i="0" u="none" strike="noStrike" baseline="0" dirty="0">
-                <a:latin typeface="SFTI1000"/>
-              </a:rPr>
-              <a:t>cyclic</a:t>
-            </a:r>
-            <a:r>
-              <a:rPr lang="en-US" sz="1800" b="0" i="0" u="none" strike="noStrike" baseline="0" dirty="0">
-                <a:latin typeface="SFRM1000"/>
-              </a:rPr>
-              <a:t>: a customer</a:t>
-            </a:r>
-          </a:p>
-          <a:p>
-            <a:pPr algn="l"/>
-            <a:r>
-              <a:rPr lang="en-US" sz="1800" b="0" i="0" u="none" strike="noStrike" baseline="0" dirty="0">
-                <a:latin typeface="SFRM1000"/>
-              </a:rPr>
-              <a:t>can iterate a few times over the same touchpoints. Moreover, the arrangement</a:t>
-            </a:r>
-          </a:p>
-          <a:p>
-            <a:pPr algn="l"/>
-            <a:r>
-              <a:rPr lang="en-US" sz="1800" b="0" i="0" u="none" strike="noStrike" baseline="0" dirty="0">
-                <a:latin typeface="SFRM1000"/>
-              </a:rPr>
-              <a:t>is </a:t>
-            </a:r>
-            <a:r>
-              <a:rPr lang="en-US" sz="1800" b="0" i="0" u="none" strike="noStrike" baseline="0" dirty="0">
-                <a:latin typeface="SFTI1000"/>
-              </a:rPr>
-              <a:t>non-linear: </a:t>
-            </a:r>
-            <a:r>
-              <a:rPr lang="en-US" sz="1800" b="0" i="0" u="none" strike="noStrike" baseline="0" dirty="0">
-                <a:latin typeface="SFRM1000"/>
-              </a:rPr>
-              <a:t>most of the time, the customer will not go through all the</a:t>
-            </a:r>
-          </a:p>
-          <a:p>
-            <a:pPr algn="l"/>
-            <a:r>
-              <a:rPr lang="en-US" sz="1800" b="0" i="0" u="none" strike="noStrike" baseline="0" dirty="0">
-                <a:latin typeface="SFRM1000"/>
-              </a:rPr>
-              <a:t>existing touchpoints the customer might miss a planned touchpoint;</a:t>
-            </a:r>
-          </a:p>
-          <a:p>
-            <a:pPr algn="l"/>
-            <a:r>
-              <a:rPr lang="en-US" sz="1800" b="0" i="0" u="none" strike="noStrike" baseline="0" dirty="0">
-                <a:latin typeface="SFRM1000"/>
-              </a:rPr>
-              <a:t>And the customer can unexpectedly quit the journey.</a:t>
-            </a:r>
-            <a:endParaRPr lang="de-DE" dirty="0"/>
-          </a:p>
-        </p:txBody>
-      </p:sp>
-    </p:spTree>
-    <p:extLst>
-      <p:ext uri="{BB962C8B-B14F-4D97-AF65-F5344CB8AC3E}">
-        <p14:creationId xmlns:p14="http://schemas.microsoft.com/office/powerpoint/2010/main" val="1568136836"/>
-      </p:ext>
-    </p:extLst>
-  </p:cSld>
-  <p:clrMapOvr>
-    <a:masterClrMapping/>
-  </p:clrMapOvr>
-</p:sld>
-</file>
-
-<file path=ppt/slides/slide6.xml><?xml version="1.0" encoding="utf-8"?>
-<p:sld xmlns:a="http://schemas.openxmlformats.org/drawingml/2006/main" xmlns:r="http://schemas.openxmlformats.org/officeDocument/2006/relationships" xmlns:p="http://schemas.openxmlformats.org/presentationml/2006/main">
-  <p:cSld>
-    <p:spTree>
-      <p:nvGrpSpPr>
-        <p:cNvPr id="1" name=""/>
-        <p:cNvGrpSpPr/>
-        <p:nvPr/>
-      </p:nvGrpSpPr>
-      <p:grpSpPr>
-        <a:xfrm>
-          <a:off x="0" y="0"/>
-          <a:ext cx="0" cy="0"/>
-          <a:chOff x="0" y="0"/>
-          <a:chExt cx="0" cy="0"/>
-        </a:xfrm>
-      </p:grpSpPr>
-      <p:sp>
-        <p:nvSpPr>
-          <p:cNvPr id="2" name="Titel 1">
-            <a:extLst>
-              <a:ext uri="{FF2B5EF4-FFF2-40B4-BE49-F238E27FC236}">
-                <a16:creationId xmlns:a16="http://schemas.microsoft.com/office/drawing/2014/main" id="{6879D8D2-07EF-416C-A247-81F1C89A4FAF}"/>
-              </a:ext>
-            </a:extLst>
-          </p:cNvPr>
-          <p:cNvSpPr>
-            <a:spLocks noGrp="1"/>
-          </p:cNvSpPr>
-          <p:nvPr>
-            <p:ph type="title"/>
-          </p:nvPr>
-        </p:nvSpPr>
-        <p:spPr/>
-        <p:txBody>
-          <a:bodyPr/>
-          <a:lstStyle/>
-          <a:p>
-            <a:pPr algn="ctr"/>
-            <a:r>
+              <a:t> al.2016]</a:t>
+            </a:r>
+            <a:br>
               <a:rPr lang="de-DE" dirty="0"/>
-              <a:t>Bestandteile einer CJM</a:t>
-            </a:r>
-          </a:p>
-        </p:txBody>
-      </p:sp>
-      <p:sp>
-        <p:nvSpPr>
-          <p:cNvPr id="4" name="Textfeld 3">
-            <a:extLst>
-              <a:ext uri="{FF2B5EF4-FFF2-40B4-BE49-F238E27FC236}">
-                <a16:creationId xmlns:a16="http://schemas.microsoft.com/office/drawing/2014/main" id="{F2778520-16A5-442E-8B6F-13AB50F62432}"/>
-              </a:ext>
-            </a:extLst>
-          </p:cNvPr>
-          <p:cNvSpPr txBox="1"/>
-          <p:nvPr/>
-        </p:nvSpPr>
-        <p:spPr>
-          <a:xfrm>
-            <a:off x="244067" y="6488668"/>
-            <a:ext cx="10382250" cy="369332"/>
-          </a:xfrm>
-          <a:prstGeom prst="rect">
-            <a:avLst/>
-          </a:prstGeom>
-          <a:noFill/>
-        </p:spPr>
-        <p:txBody>
-          <a:bodyPr wrap="square" rtlCol="0">
-            <a:spAutoFit/>
-          </a:bodyPr>
-          <a:lstStyle/>
-          <a:p>
-            <a:r>
-              <a:rPr lang="de-DE" dirty="0"/>
-              <a:t>Aus: </a:t>
-            </a:r>
-            <a:r>
-              <a:rPr lang="en-US" dirty="0"/>
-              <a:t>Supporting redesign of C2C services through customer journey mapping</a:t>
-            </a:r>
+            </a:br>
             <a:endParaRPr lang="de-DE" dirty="0"/>
           </a:p>
         </p:txBody>
@@ -6496,7 +8209,7 @@
 </p:sld>
 </file>
 
-<file path=ppt/slides/slide7.xml><?xml version="1.0" encoding="utf-8"?>
+<file path=ppt/slides/slide6.xml><?xml version="1.0" encoding="utf-8"?>
 <p:sld xmlns:a="http://schemas.openxmlformats.org/drawingml/2006/main" xmlns:r="http://schemas.openxmlformats.org/officeDocument/2006/relationships" xmlns:p="http://schemas.openxmlformats.org/presentationml/2006/main">
   <p:cSld>
     <p:spTree>
@@ -6580,10 +8293,10 @@
       </p:pic>
       <p:sp>
         <p:nvSpPr>
-          <p:cNvPr id="4" name="Textfeld 3">
-            <a:extLst>
-              <a:ext uri="{FF2B5EF4-FFF2-40B4-BE49-F238E27FC236}">
-                <a16:creationId xmlns:a16="http://schemas.microsoft.com/office/drawing/2014/main" id="{F20ECE82-4680-45C4-8768-DFC0CDF03884}"/>
+          <p:cNvPr id="7" name="Textfeld 6">
+            <a:extLst>
+              <a:ext uri="{FF2B5EF4-FFF2-40B4-BE49-F238E27FC236}">
+                <a16:creationId xmlns:a16="http://schemas.microsoft.com/office/drawing/2014/main" id="{163356FB-8450-43EE-B42D-F347717A41C6}"/>
               </a:ext>
             </a:extLst>
           </p:cNvPr>
@@ -6592,8 +8305,8 @@
         </p:nvSpPr>
         <p:spPr>
           <a:xfrm>
-            <a:off x="244067" y="6488668"/>
-            <a:ext cx="10382250" cy="369332"/>
+            <a:off x="218900" y="6488668"/>
+            <a:ext cx="10382250" cy="523220"/>
           </a:xfrm>
           <a:prstGeom prst="rect">
             <a:avLst/>
@@ -6607,13 +8320,29 @@
           <a:lstStyle/>
           <a:p>
             <a:r>
+              <a:rPr lang="de-DE" sz="1000" b="0" i="0" dirty="0">
+                <a:effectLst/>
+                <a:latin typeface="Arial" panose="020B0604020202020204" pitchFamily="34" charset="0"/>
+              </a:rPr>
+              <a:t>[</a:t>
+            </a:r>
+            <a:r>
+              <a:rPr lang="de-DE" sz="1000" b="0" i="0" dirty="0" err="1">
+                <a:effectLst/>
+                <a:latin typeface="Arial" panose="020B0604020202020204" pitchFamily="34" charset="0"/>
+              </a:rPr>
+              <a:t>Haugstveitet</a:t>
+            </a:r>
+            <a:r>
+              <a:rPr lang="de-DE" sz="1000" b="0" i="0" dirty="0">
+                <a:effectLst/>
+                <a:latin typeface="Arial" panose="020B0604020202020204" pitchFamily="34" charset="0"/>
+              </a:rPr>
+              <a:t> al.2016]</a:t>
+            </a:r>
+            <a:br>
               <a:rPr lang="de-DE" dirty="0"/>
-              <a:t>Aus: </a:t>
-            </a:r>
-            <a:r>
-              <a:rPr lang="en-US" dirty="0"/>
-              <a:t>Supporting redesign of C2C services through customer journey mapping</a:t>
-            </a:r>
+            </a:br>
             <a:endParaRPr lang="de-DE" dirty="0"/>
           </a:p>
         </p:txBody>
@@ -6631,7 +8360,7 @@
 </p:sld>
 </file>
 
-<file path=ppt/slides/slide8.xml><?xml version="1.0" encoding="utf-8"?>
+<file path=ppt/slides/slide7.xml><?xml version="1.0" encoding="utf-8"?>
 <p:sld xmlns:a="http://schemas.openxmlformats.org/drawingml/2006/main" xmlns:r="http://schemas.openxmlformats.org/officeDocument/2006/relationships" xmlns:p="http://schemas.openxmlformats.org/presentationml/2006/main">
   <p:cSld>
     <p:bg>
@@ -6898,7 +8627,7 @@
 </p:sld>
 </file>
 
-<file path=ppt/slides/slide9.xml><?xml version="1.0" encoding="utf-8"?>
+<file path=ppt/slides/slide8.xml><?xml version="1.0" encoding="utf-8"?>
 <p:sld xmlns:a="http://schemas.openxmlformats.org/drawingml/2006/main" xmlns:r="http://schemas.openxmlformats.org/officeDocument/2006/relationships" xmlns:p="http://schemas.openxmlformats.org/presentationml/2006/main">
   <p:cSld>
     <p:spTree>
@@ -6990,6 +8719,357 @@
     <p:extLst>
       <p:ext uri="{BB962C8B-B14F-4D97-AF65-F5344CB8AC3E}">
         <p14:creationId xmlns:p14="http://schemas.microsoft.com/office/powerpoint/2010/main" val="1415600349"/>
+      </p:ext>
+    </p:extLst>
+  </p:cSld>
+  <p:clrMapOvr>
+    <a:masterClrMapping/>
+  </p:clrMapOvr>
+</p:sld>
+</file>
+
+<file path=ppt/slides/slide9.xml><?xml version="1.0" encoding="utf-8"?>
+<p:sld xmlns:a="http://schemas.openxmlformats.org/drawingml/2006/main" xmlns:r="http://schemas.openxmlformats.org/officeDocument/2006/relationships" xmlns:p="http://schemas.openxmlformats.org/presentationml/2006/main">
+  <p:cSld>
+    <p:bg>
+      <p:bgPr>
+        <a:solidFill>
+          <a:schemeClr val="bg1"/>
+        </a:solidFill>
+        <a:effectLst/>
+      </p:bgPr>
+    </p:bg>
+    <p:spTree>
+      <p:nvGrpSpPr>
+        <p:cNvPr id="1" name=""/>
+        <p:cNvGrpSpPr/>
+        <p:nvPr/>
+      </p:nvGrpSpPr>
+      <p:grpSpPr>
+        <a:xfrm>
+          <a:off x="0" y="0"/>
+          <a:ext cx="0" cy="0"/>
+          <a:chOff x="0" y="0"/>
+          <a:chExt cx="0" cy="0"/>
+        </a:xfrm>
+      </p:grpSpPr>
+      <p:sp useBgFill="1">
+        <p:nvSpPr>
+          <p:cNvPr id="23" name="Rectangle 22">
+            <a:extLst>
+              <a:ext uri="{FF2B5EF4-FFF2-40B4-BE49-F238E27FC236}">
+                <a16:creationId xmlns:a16="http://schemas.microsoft.com/office/drawing/2014/main" id="{D19BB8BE-1351-4D9B-B761-F84A0B5B6519}"/>
+              </a:ext>
+              <a:ext uri="{C183D7F6-B498-43B3-948B-1728B52AA6E4}">
+                <adec:decorative xmlns:adec="http://schemas.microsoft.com/office/drawing/2017/decorative" val="1"/>
+              </a:ext>
+            </a:extLst>
+          </p:cNvPr>
+          <p:cNvSpPr>
+            <a:spLocks noGrp="1" noRot="1" noChangeAspect="1" noMove="1" noResize="1" noEditPoints="1" noAdjustHandles="1" noChangeArrowheads="1" noChangeShapeType="1" noTextEdit="1"/>
+          </p:cNvSpPr>
+          <p:nvPr>
+            <p:extLst>
+              <p:ext uri="{386F3935-93C4-4BCD-93E2-E3B085C9AB24}">
+                <p16:designElem xmlns:p16="http://schemas.microsoft.com/office/powerpoint/2015/main" val="1"/>
+              </p:ext>
+            </p:extLst>
+          </p:nvPr>
+        </p:nvSpPr>
+        <p:spPr>
+          <a:xfrm>
+            <a:off x="-1" y="0"/>
+            <a:ext cx="12188952" cy="6858000"/>
+          </a:xfrm>
+          <a:prstGeom prst="rect">
+            <a:avLst/>
+          </a:prstGeom>
+          <a:ln>
+            <a:noFill/>
+          </a:ln>
+        </p:spPr>
+        <p:style>
+          <a:lnRef idx="2">
+            <a:schemeClr val="accent1">
+              <a:shade val="50000"/>
+            </a:schemeClr>
+          </a:lnRef>
+          <a:fillRef idx="1">
+            <a:schemeClr val="accent1"/>
+          </a:fillRef>
+          <a:effectRef idx="0">
+            <a:schemeClr val="accent1"/>
+          </a:effectRef>
+          <a:fontRef idx="minor">
+            <a:schemeClr val="lt1"/>
+          </a:fontRef>
+        </p:style>
+        <p:txBody>
+          <a:bodyPr rtlCol="0" anchor="ctr"/>
+          <a:lstStyle/>
+          <a:p>
+            <a:pPr algn="ctr"/>
+            <a:endParaRPr lang="en-US"/>
+          </a:p>
+        </p:txBody>
+      </p:sp>
+      <p:sp>
+        <p:nvSpPr>
+          <p:cNvPr id="2" name="Titel 1">
+            <a:extLst>
+              <a:ext uri="{FF2B5EF4-FFF2-40B4-BE49-F238E27FC236}">
+                <a16:creationId xmlns:a16="http://schemas.microsoft.com/office/drawing/2014/main" id="{FF597BAC-6CF9-4073-A515-BB628891AE92}"/>
+              </a:ext>
+            </a:extLst>
+          </p:cNvPr>
+          <p:cNvSpPr>
+            <a:spLocks noGrp="1"/>
+          </p:cNvSpPr>
+          <p:nvPr>
+            <p:ph type="title"/>
+          </p:nvPr>
+        </p:nvSpPr>
+        <p:spPr>
+          <a:xfrm>
+            <a:off x="143627" y="458818"/>
+            <a:ext cx="3785554" cy="911109"/>
+          </a:xfrm>
+        </p:spPr>
+        <p:txBody>
+          <a:bodyPr vert="horz" lIns="91440" tIns="45720" rIns="91440" bIns="45720" rtlCol="0" anchor="b">
+            <a:normAutofit/>
+          </a:bodyPr>
+          <a:lstStyle/>
+          <a:p>
+            <a:pPr algn="ctr"/>
+            <a:r>
+              <a:rPr lang="en-US" sz="4000" kern="1200" dirty="0" err="1">
+                <a:solidFill>
+                  <a:schemeClr val="tx1"/>
+                </a:solidFill>
+                <a:latin typeface="+mj-lt"/>
+                <a:ea typeface="+mj-ea"/>
+                <a:cs typeface="+mj-cs"/>
+              </a:rPr>
+              <a:t>Fallbeispiel</a:t>
+            </a:r>
+            <a:endParaRPr lang="en-US" sz="4000" kern="1200" dirty="0">
+              <a:solidFill>
+                <a:schemeClr val="tx1"/>
+              </a:solidFill>
+              <a:latin typeface="+mj-lt"/>
+              <a:ea typeface="+mj-ea"/>
+              <a:cs typeface="+mj-cs"/>
+            </a:endParaRPr>
+          </a:p>
+        </p:txBody>
+      </p:sp>
+      <p:sp>
+        <p:nvSpPr>
+          <p:cNvPr id="4" name="Textfeld 3">
+            <a:extLst>
+              <a:ext uri="{FF2B5EF4-FFF2-40B4-BE49-F238E27FC236}">
+                <a16:creationId xmlns:a16="http://schemas.microsoft.com/office/drawing/2014/main" id="{EE98651D-1846-4664-86CB-10AB701FE291}"/>
+              </a:ext>
+            </a:extLst>
+          </p:cNvPr>
+          <p:cNvSpPr txBox="1"/>
+          <p:nvPr/>
+        </p:nvSpPr>
+        <p:spPr>
+          <a:xfrm>
+            <a:off x="334859" y="2327918"/>
+            <a:ext cx="3339519" cy="3116537"/>
+          </a:xfrm>
+          <a:prstGeom prst="rect">
+            <a:avLst/>
+          </a:prstGeom>
+        </p:spPr>
+        <p:txBody>
+          <a:bodyPr vert="horz" lIns="91440" tIns="45720" rIns="91440" bIns="45720" rtlCol="0">
+            <a:normAutofit/>
+          </a:bodyPr>
+          <a:lstStyle/>
+          <a:p>
+            <a:pPr>
+              <a:lnSpc>
+                <a:spcPct val="90000"/>
+              </a:lnSpc>
+              <a:spcAft>
+                <a:spcPts val="600"/>
+              </a:spcAft>
+            </a:pPr>
+            <a:r>
+              <a:rPr lang="en-US" sz="2000" dirty="0" err="1"/>
+              <a:t>Im</a:t>
+            </a:r>
+            <a:r>
+              <a:rPr lang="en-US" sz="2000" dirty="0"/>
+              <a:t> </a:t>
+            </a:r>
+            <a:r>
+              <a:rPr lang="en-US" sz="2000" dirty="0" err="1"/>
+              <a:t>Fallbeispiel</a:t>
+            </a:r>
+            <a:r>
+              <a:rPr lang="en-US" sz="2000" dirty="0"/>
+              <a:t> </a:t>
+            </a:r>
+            <a:r>
+              <a:rPr lang="en-US" sz="2000" dirty="0" err="1"/>
+              <a:t>wird</a:t>
+            </a:r>
+            <a:r>
+              <a:rPr lang="en-US" sz="2000" dirty="0"/>
+              <a:t> </a:t>
+            </a:r>
+            <a:r>
+              <a:rPr lang="en-US" sz="2000" dirty="0" err="1"/>
+              <a:t>eines</a:t>
+            </a:r>
+            <a:r>
+              <a:rPr lang="en-US" sz="2000" dirty="0"/>
+              <a:t> der </a:t>
+            </a:r>
+            <a:r>
+              <a:rPr lang="en-US" sz="2000" dirty="0" err="1"/>
+              <a:t>weltweit</a:t>
+            </a:r>
+            <a:r>
+              <a:rPr lang="en-US" sz="2000" dirty="0"/>
+              <a:t> </a:t>
+            </a:r>
+            <a:r>
+              <a:rPr lang="en-US" sz="2000" dirty="0" err="1"/>
+              <a:t>größten</a:t>
+            </a:r>
+            <a:r>
+              <a:rPr lang="en-US" sz="2000" dirty="0"/>
+              <a:t> </a:t>
+            </a:r>
+            <a:r>
+              <a:rPr lang="en-US" sz="2000" dirty="0" err="1"/>
+              <a:t>Einkaufszentren</a:t>
+            </a:r>
+            <a:r>
+              <a:rPr lang="en-US" sz="2000" dirty="0"/>
+              <a:t> </a:t>
+            </a:r>
+            <a:r>
+              <a:rPr lang="en-US" sz="2000" dirty="0" err="1"/>
+              <a:t>anaysiert</a:t>
+            </a:r>
+            <a:r>
+              <a:rPr lang="en-US" sz="2000" dirty="0"/>
+              <a:t>. Dieses </a:t>
+            </a:r>
+            <a:r>
+              <a:rPr lang="en-US" sz="2000" dirty="0" err="1"/>
+              <a:t>bietet</a:t>
+            </a:r>
+            <a:r>
+              <a:rPr lang="en-US" sz="2000" dirty="0"/>
+              <a:t> den </a:t>
+            </a:r>
+            <a:r>
+              <a:rPr lang="en-US" sz="2000" dirty="0" err="1"/>
+              <a:t>Kunden</a:t>
+            </a:r>
+            <a:r>
+              <a:rPr lang="en-US" sz="2000" dirty="0"/>
+              <a:t> </a:t>
+            </a:r>
+            <a:r>
+              <a:rPr lang="en-US" sz="2000" dirty="0" err="1"/>
+              <a:t>ein</a:t>
+            </a:r>
+            <a:r>
+              <a:rPr lang="en-US" sz="2000" dirty="0"/>
+              <a:t> </a:t>
+            </a:r>
+            <a:r>
+              <a:rPr lang="en-US" sz="2000" dirty="0" err="1"/>
+              <a:t>vielfältiges</a:t>
+            </a:r>
+            <a:r>
+              <a:rPr lang="en-US" sz="2000" dirty="0"/>
+              <a:t> </a:t>
+            </a:r>
+            <a:r>
+              <a:rPr lang="en-US" sz="2000" dirty="0" err="1"/>
+              <a:t>Angebot</a:t>
+            </a:r>
+            <a:r>
+              <a:rPr lang="en-US" sz="2000" dirty="0"/>
+              <a:t> an </a:t>
+            </a:r>
+            <a:r>
+              <a:rPr lang="en-US" sz="2000" dirty="0" err="1"/>
+              <a:t>Einkaufs</a:t>
+            </a:r>
+            <a:r>
+              <a:rPr lang="en-US" sz="2000" dirty="0"/>
+              <a:t>-, </a:t>
+            </a:r>
+            <a:r>
+              <a:rPr lang="en-US" sz="2000" dirty="0" err="1"/>
+              <a:t>Unterhaltungs</a:t>
+            </a:r>
+            <a:r>
+              <a:rPr lang="en-US" sz="2000" dirty="0"/>
+              <a:t>- und Essen/</a:t>
+            </a:r>
+            <a:r>
+              <a:rPr lang="en-US" sz="2000" dirty="0" err="1"/>
+              <a:t>Getränke-Optionen</a:t>
+            </a:r>
+            <a:r>
+              <a:rPr lang="en-US" sz="2000" dirty="0"/>
+              <a:t>.</a:t>
+            </a:r>
+          </a:p>
+        </p:txBody>
+      </p:sp>
+      <p:pic>
+        <p:nvPicPr>
+          <p:cNvPr id="6" name="Grafik 5" descr="Ein Bild, das Tisch enthält.&#10;&#10;Automatisch generierte Beschreibung">
+            <a:extLst>
+              <a:ext uri="{FF2B5EF4-FFF2-40B4-BE49-F238E27FC236}">
+                <a16:creationId xmlns:a16="http://schemas.microsoft.com/office/drawing/2014/main" id="{5A233545-5E78-40BF-888B-FD51E0D7CEA7}"/>
+              </a:ext>
+            </a:extLst>
+          </p:cNvPr>
+          <p:cNvPicPr>
+            <a:picLocks noChangeAspect="1"/>
+          </p:cNvPicPr>
+          <p:nvPr/>
+        </p:nvPicPr>
+        <p:blipFill>
+          <a:blip r:embed="rId2">
+            <a:extLst>
+              <a:ext uri="{28A0092B-C50C-407E-A947-70E740481C1C}">
+                <a14:useLocalDpi xmlns:a14="http://schemas.microsoft.com/office/drawing/2010/main" val="0"/>
+              </a:ext>
+            </a:extLst>
+          </a:blip>
+          <a:stretch>
+            <a:fillRect/>
+          </a:stretch>
+        </p:blipFill>
+        <p:spPr>
+          <a:xfrm>
+            <a:off x="3929181" y="1130417"/>
+            <a:ext cx="7995072" cy="4597166"/>
+          </a:xfrm>
+          <a:prstGeom prst="rect">
+            <a:avLst/>
+          </a:prstGeom>
+        </p:spPr>
+      </p:pic>
+    </p:spTree>
+    <p:extLst>
+      <p:ext uri="{BB962C8B-B14F-4D97-AF65-F5344CB8AC3E}">
+        <p14:creationId xmlns:p14="http://schemas.microsoft.com/office/powerpoint/2010/main" val="1622403623"/>
       </p:ext>
     </p:extLst>
   </p:cSld>

</xml_diff>